<commit_message>
Ajout fiche E4, fix use case, spec technique
</commit_message>
<xml_diff>
--- a/Documentation/Ecrit/03b_Diagramme_de_cas.pptx
+++ b/Documentation/Ecrit/03b_Diagramme_de_cas.pptx
@@ -109,10 +109,297 @@
   </p:defaultTextStyle>
   <p:extLst>
     <p:ext uri="{EFAFB233-063F-42B5-8137-9DF3F51BA10A}">
-      <p15:sldGuideLst xmlns:p15="http://schemas.microsoft.com/office/powerpoint/2012/main" xmlns=""/>
+      <p15:sldGuideLst xmlns:p15="http://schemas.microsoft.com/office/powerpoint/2012/main">
+        <p15:guide id="1" orient="horz" pos="2160">
+          <p15:clr>
+            <a:srgbClr val="A4A3A4"/>
+          </p15:clr>
+        </p15:guide>
+        <p15:guide id="2" pos="3840">
+          <p15:clr>
+            <a:srgbClr val="A4A3A4"/>
+          </p15:clr>
+        </p15:guide>
+      </p15:sldGuideLst>
     </p:ext>
   </p:extLst>
 </p:presentation>
+</file>
+
+<file path=ppt/revisionInfo.xml><?xml version="1.0" encoding="utf-8"?>
+<p1510:revInfo xmlns:a="http://schemas.openxmlformats.org/drawingml/2006/main" xmlns:r="http://schemas.openxmlformats.org/officeDocument/2006/relationships" xmlns:p1510="http://schemas.microsoft.com/office/powerpoint/2015/10/main">
+  <p1510:revLst>
+    <p1510:client id="{897410AA-0F5F-498B-AF46-0BBA82E09B2A}" v="4" dt="2020-03-18T15:14:26.330"/>
+  </p1510:revLst>
+</p1510:revInfo>
+</file>
+
+<file path=ppt/changesInfos/changesInfo1.xml><?xml version="1.0" encoding="utf-8"?>
+<pc:chgInfo xmlns:a="http://schemas.openxmlformats.org/drawingml/2006/main" xmlns:r="http://schemas.openxmlformats.org/officeDocument/2006/relationships" xmlns:ac="http://schemas.microsoft.com/office/drawing/2013/main/command" xmlns:pc="http://schemas.microsoft.com/office/powerpoint/2013/main/command">
+  <pc:docChgLst>
+    <pc:chgData name="Vivian G" userId="217fb073e6d8a319" providerId="LiveId" clId="{897410AA-0F5F-498B-AF46-0BBA82E09B2A}"/>
+    <pc:docChg chg="undo custSel modSld">
+      <pc:chgData name="Vivian G" userId="217fb073e6d8a319" providerId="LiveId" clId="{897410AA-0F5F-498B-AF46-0BBA82E09B2A}" dt="2020-03-18T15:15:07.733" v="232" actId="20577"/>
+      <pc:docMkLst>
+        <pc:docMk/>
+      </pc:docMkLst>
+      <pc:sldChg chg="addSp delSp modSp">
+        <pc:chgData name="Vivian G" userId="217fb073e6d8a319" providerId="LiveId" clId="{897410AA-0F5F-498B-AF46-0BBA82E09B2A}" dt="2020-03-18T15:14:09.945" v="195" actId="14100"/>
+        <pc:sldMkLst>
+          <pc:docMk/>
+          <pc:sldMk cId="898712602" sldId="256"/>
+        </pc:sldMkLst>
+        <pc:spChg chg="mod">
+          <ac:chgData name="Vivian G" userId="217fb073e6d8a319" providerId="LiveId" clId="{897410AA-0F5F-498B-AF46-0BBA82E09B2A}" dt="2020-03-18T15:13:30.562" v="150" actId="1076"/>
+          <ac:spMkLst>
+            <pc:docMk/>
+            <pc:sldMk cId="898712602" sldId="256"/>
+            <ac:spMk id="11" creationId="{82AB6933-3476-43A6-848A-40D65BD00D18}"/>
+          </ac:spMkLst>
+        </pc:spChg>
+        <pc:spChg chg="del">
+          <ac:chgData name="Vivian G" userId="217fb073e6d8a319" providerId="LiveId" clId="{897410AA-0F5F-498B-AF46-0BBA82E09B2A}" dt="2020-03-18T15:11:05.136" v="92" actId="478"/>
+          <ac:spMkLst>
+            <pc:docMk/>
+            <pc:sldMk cId="898712602" sldId="256"/>
+            <ac:spMk id="13" creationId="{C34807EB-0774-443D-B5C9-C7C8424BC2CB}"/>
+          </ac:spMkLst>
+        </pc:spChg>
+        <pc:spChg chg="mod">
+          <ac:chgData name="Vivian G" userId="217fb073e6d8a319" providerId="LiveId" clId="{897410AA-0F5F-498B-AF46-0BBA82E09B2A}" dt="2020-03-18T15:09:42.949" v="23" actId="20577"/>
+          <ac:spMkLst>
+            <pc:docMk/>
+            <pc:sldMk cId="898712602" sldId="256"/>
+            <ac:spMk id="20" creationId="{B8112496-D570-4564-812C-5162B26FBA8A}"/>
+          </ac:spMkLst>
+        </pc:spChg>
+        <pc:spChg chg="mod">
+          <ac:chgData name="Vivian G" userId="217fb073e6d8a319" providerId="LiveId" clId="{897410AA-0F5F-498B-AF46-0BBA82E09B2A}" dt="2020-03-18T15:14:00.381" v="193" actId="20577"/>
+          <ac:spMkLst>
+            <pc:docMk/>
+            <pc:sldMk cId="898712602" sldId="256"/>
+            <ac:spMk id="21" creationId="{C761AF7C-91AA-4DC4-A947-F9CCFA88603B}"/>
+          </ac:spMkLst>
+        </pc:spChg>
+        <pc:spChg chg="del mod">
+          <ac:chgData name="Vivian G" userId="217fb073e6d8a319" providerId="LiveId" clId="{897410AA-0F5F-498B-AF46-0BBA82E09B2A}" dt="2020-03-18T15:11:29.207" v="103" actId="478"/>
+          <ac:spMkLst>
+            <pc:docMk/>
+            <pc:sldMk cId="898712602" sldId="256"/>
+            <ac:spMk id="24" creationId="{C80D4B28-9F40-48AD-A21B-63B73871B3B9}"/>
+          </ac:spMkLst>
+        </pc:spChg>
+        <pc:spChg chg="add mod">
+          <ac:chgData name="Vivian G" userId="217fb073e6d8a319" providerId="LiveId" clId="{897410AA-0F5F-498B-AF46-0BBA82E09B2A}" dt="2020-03-18T15:12:49.206" v="112" actId="1076"/>
+          <ac:spMkLst>
+            <pc:docMk/>
+            <pc:sldMk cId="898712602" sldId="256"/>
+            <ac:spMk id="25" creationId="{14DF6337-FCDC-4CF2-9872-85B93072B55F}"/>
+          </ac:spMkLst>
+        </pc:spChg>
+        <pc:spChg chg="add mod">
+          <ac:chgData name="Vivian G" userId="217fb073e6d8a319" providerId="LiveId" clId="{897410AA-0F5F-498B-AF46-0BBA82E09B2A}" dt="2020-03-18T15:12:53.050" v="121" actId="20577"/>
+          <ac:spMkLst>
+            <pc:docMk/>
+            <pc:sldMk cId="898712602" sldId="256"/>
+            <ac:spMk id="26" creationId="{E41484C4-BD4B-453D-BD08-A4EC6E85FE4F}"/>
+          </ac:spMkLst>
+        </pc:spChg>
+        <pc:spChg chg="add mod">
+          <ac:chgData name="Vivian G" userId="217fb073e6d8a319" providerId="LiveId" clId="{897410AA-0F5F-498B-AF46-0BBA82E09B2A}" dt="2020-03-18T15:13:04.021" v="143" actId="20577"/>
+          <ac:spMkLst>
+            <pc:docMk/>
+            <pc:sldMk cId="898712602" sldId="256"/>
+            <ac:spMk id="28" creationId="{C32BC31E-5EF0-47B6-89D7-FACC151A1656}"/>
+          </ac:spMkLst>
+        </pc:spChg>
+        <pc:spChg chg="del">
+          <ac:chgData name="Vivian G" userId="217fb073e6d8a319" providerId="LiveId" clId="{897410AA-0F5F-498B-AF46-0BBA82E09B2A}" dt="2020-03-18T15:11:06.925" v="94" actId="478"/>
+          <ac:spMkLst>
+            <pc:docMk/>
+            <pc:sldMk cId="898712602" sldId="256"/>
+            <ac:spMk id="30" creationId="{C34807EB-0774-443D-B5C9-C7C8424BC2CB}"/>
+          </ac:spMkLst>
+        </pc:spChg>
+        <pc:spChg chg="add mod">
+          <ac:chgData name="Vivian G" userId="217fb073e6d8a319" providerId="LiveId" clId="{897410AA-0F5F-498B-AF46-0BBA82E09B2A}" dt="2020-03-18T15:13:25.119" v="149" actId="1076"/>
+          <ac:spMkLst>
+            <pc:docMk/>
+            <pc:sldMk cId="898712602" sldId="256"/>
+            <ac:spMk id="32" creationId="{5EE05DFB-6656-4BBB-97BD-596407B61579}"/>
+          </ac:spMkLst>
+        </pc:spChg>
+        <pc:spChg chg="del">
+          <ac:chgData name="Vivian G" userId="217fb073e6d8a319" providerId="LiveId" clId="{897410AA-0F5F-498B-AF46-0BBA82E09B2A}" dt="2020-03-18T15:11:05.945" v="93" actId="478"/>
+          <ac:spMkLst>
+            <pc:docMk/>
+            <pc:sldMk cId="898712602" sldId="256"/>
+            <ac:spMk id="33" creationId="{6D38FFAD-5DE0-4B65-8D2E-174388C79FC3}"/>
+          </ac:spMkLst>
+        </pc:spChg>
+        <pc:spChg chg="add mod">
+          <ac:chgData name="Vivian G" userId="217fb073e6d8a319" providerId="LiveId" clId="{897410AA-0F5F-498B-AF46-0BBA82E09B2A}" dt="2020-03-18T15:13:44.004" v="182" actId="20577"/>
+          <ac:spMkLst>
+            <pc:docMk/>
+            <pc:sldMk cId="898712602" sldId="256"/>
+            <ac:spMk id="34" creationId="{5B809223-CE93-48DF-AC11-EF1E3C1901C5}"/>
+          </ac:spMkLst>
+        </pc:spChg>
+        <pc:spChg chg="mod">
+          <ac:chgData name="Vivian G" userId="217fb073e6d8a319" providerId="LiveId" clId="{897410AA-0F5F-498B-AF46-0BBA82E09B2A}" dt="2020-03-18T15:11:31.908" v="104" actId="1076"/>
+          <ac:spMkLst>
+            <pc:docMk/>
+            <pc:sldMk cId="898712602" sldId="256"/>
+            <ac:spMk id="37" creationId="{3E175212-5FF3-434B-A914-908ABCB0D72B}"/>
+          </ac:spMkLst>
+        </pc:spChg>
+        <pc:spChg chg="del">
+          <ac:chgData name="Vivian G" userId="217fb073e6d8a319" providerId="LiveId" clId="{897410AA-0F5F-498B-AF46-0BBA82E09B2A}" dt="2020-03-18T15:11:35.022" v="106" actId="478"/>
+          <ac:spMkLst>
+            <pc:docMk/>
+            <pc:sldMk cId="898712602" sldId="256"/>
+            <ac:spMk id="40" creationId="{3E175212-5FF3-434B-A914-908ABCB0D72B}"/>
+          </ac:spMkLst>
+        </pc:spChg>
+        <pc:spChg chg="add mod">
+          <ac:chgData name="Vivian G" userId="217fb073e6d8a319" providerId="LiveId" clId="{897410AA-0F5F-498B-AF46-0BBA82E09B2A}" dt="2020-03-18T15:13:38.314" v="171" actId="20577"/>
+          <ac:spMkLst>
+            <pc:docMk/>
+            <pc:sldMk cId="898712602" sldId="256"/>
+            <ac:spMk id="41" creationId="{9043F4C9-BA42-4387-A6F0-69CCC42341E3}"/>
+          </ac:spMkLst>
+        </pc:spChg>
+        <pc:grpChg chg="add mod">
+          <ac:chgData name="Vivian G" userId="217fb073e6d8a319" providerId="LiveId" clId="{897410AA-0F5F-498B-AF46-0BBA82E09B2A}" dt="2020-03-18T15:14:07.634" v="194" actId="14100"/>
+          <ac:grpSpMkLst>
+            <pc:docMk/>
+            <pc:sldMk cId="898712602" sldId="256"/>
+            <ac:grpSpMk id="19" creationId="{563865CC-9268-4A48-9488-B205E9D0268E}"/>
+          </ac:grpSpMkLst>
+        </pc:grpChg>
+        <pc:picChg chg="mod">
+          <ac:chgData name="Vivian G" userId="217fb073e6d8a319" providerId="LiveId" clId="{897410AA-0F5F-498B-AF46-0BBA82E09B2A}" dt="2020-03-18T15:13:30.562" v="150" actId="1076"/>
+          <ac:picMkLst>
+            <pc:docMk/>
+            <pc:sldMk cId="898712602" sldId="256"/>
+            <ac:picMk id="7" creationId="{7EA3BBB4-6372-4F91-A449-831237C5C455}"/>
+          </ac:picMkLst>
+        </pc:picChg>
+        <pc:cxnChg chg="del mod">
+          <ac:chgData name="Vivian G" userId="217fb073e6d8a319" providerId="LiveId" clId="{897410AA-0F5F-498B-AF46-0BBA82E09B2A}" dt="2020-03-18T15:11:36.908" v="108" actId="478"/>
+          <ac:cxnSpMkLst>
+            <pc:docMk/>
+            <pc:sldMk cId="898712602" sldId="256"/>
+            <ac:cxnSpMk id="4" creationId="{94EE7817-952C-46F9-AEA1-B12C445AA075}"/>
+          </ac:cxnSpMkLst>
+        </pc:cxnChg>
+        <pc:cxnChg chg="del mod">
+          <ac:chgData name="Vivian G" userId="217fb073e6d8a319" providerId="LiveId" clId="{897410AA-0F5F-498B-AF46-0BBA82E09B2A}" dt="2020-03-18T15:11:28.100" v="101" actId="478"/>
+          <ac:cxnSpMkLst>
+            <pc:docMk/>
+            <pc:sldMk cId="898712602" sldId="256"/>
+            <ac:cxnSpMk id="23" creationId="{D4187190-3D83-40A7-A51B-78582ED94F37}"/>
+          </ac:cxnSpMkLst>
+        </pc:cxnChg>
+        <pc:cxnChg chg="add mod">
+          <ac:chgData name="Vivian G" userId="217fb073e6d8a319" providerId="LiveId" clId="{897410AA-0F5F-498B-AF46-0BBA82E09B2A}" dt="2020-03-18T15:14:09.945" v="195" actId="14100"/>
+          <ac:cxnSpMkLst>
+            <pc:docMk/>
+            <pc:sldMk cId="898712602" sldId="256"/>
+            <ac:cxnSpMk id="27" creationId="{2BA00DB8-06D8-4B6B-BCD3-2392483EC006}"/>
+          </ac:cxnSpMkLst>
+        </pc:cxnChg>
+        <pc:cxnChg chg="add mod">
+          <ac:chgData name="Vivian G" userId="217fb073e6d8a319" providerId="LiveId" clId="{897410AA-0F5F-498B-AF46-0BBA82E09B2A}" dt="2020-03-18T15:12:43.825" v="110" actId="1076"/>
+          <ac:cxnSpMkLst>
+            <pc:docMk/>
+            <pc:sldMk cId="898712602" sldId="256"/>
+            <ac:cxnSpMk id="29" creationId="{38C74184-18EA-4FB9-9646-1BE332DE96D1}"/>
+          </ac:cxnSpMkLst>
+        </pc:cxnChg>
+        <pc:cxnChg chg="del">
+          <ac:chgData name="Vivian G" userId="217fb073e6d8a319" providerId="LiveId" clId="{897410AA-0F5F-498B-AF46-0BBA82E09B2A}" dt="2020-03-18T15:11:36.108" v="107" actId="478"/>
+          <ac:cxnSpMkLst>
+            <pc:docMk/>
+            <pc:sldMk cId="898712602" sldId="256"/>
+            <ac:cxnSpMk id="31" creationId="{182766B4-113A-4456-9F5C-D5373D99B750}"/>
+          </ac:cxnSpMkLst>
+        </pc:cxnChg>
+        <pc:cxnChg chg="mod">
+          <ac:chgData name="Vivian G" userId="217fb073e6d8a319" providerId="LiveId" clId="{897410AA-0F5F-498B-AF46-0BBA82E09B2A}" dt="2020-03-18T15:14:07.634" v="194" actId="14100"/>
+          <ac:cxnSpMkLst>
+            <pc:docMk/>
+            <pc:sldMk cId="898712602" sldId="256"/>
+            <ac:cxnSpMk id="35" creationId="{182766B4-113A-4456-9F5C-D5373D99B750}"/>
+          </ac:cxnSpMkLst>
+        </pc:cxnChg>
+        <pc:cxnChg chg="mod">
+          <ac:chgData name="Vivian G" userId="217fb073e6d8a319" providerId="LiveId" clId="{897410AA-0F5F-498B-AF46-0BBA82E09B2A}" dt="2020-03-18T15:14:07.634" v="194" actId="14100"/>
+          <ac:cxnSpMkLst>
+            <pc:docMk/>
+            <pc:sldMk cId="898712602" sldId="256"/>
+            <ac:cxnSpMk id="36" creationId="{D186EB09-B5F6-4EE7-A72D-0599C9D2A89D}"/>
+          </ac:cxnSpMkLst>
+        </pc:cxnChg>
+        <pc:cxnChg chg="del mod">
+          <ac:chgData name="Vivian G" userId="217fb073e6d8a319" providerId="LiveId" clId="{897410AA-0F5F-498B-AF46-0BBA82E09B2A}" dt="2020-03-18T15:11:33.883" v="105" actId="478"/>
+          <ac:cxnSpMkLst>
+            <pc:docMk/>
+            <pc:sldMk cId="898712602" sldId="256"/>
+            <ac:cxnSpMk id="38" creationId="{D186EB09-B5F6-4EE7-A72D-0599C9D2A89D}"/>
+          </ac:cxnSpMkLst>
+        </pc:cxnChg>
+        <pc:cxnChg chg="add mod">
+          <ac:chgData name="Vivian G" userId="217fb073e6d8a319" providerId="LiveId" clId="{897410AA-0F5F-498B-AF46-0BBA82E09B2A}" dt="2020-03-18T15:14:07.634" v="194" actId="14100"/>
+          <ac:cxnSpMkLst>
+            <pc:docMk/>
+            <pc:sldMk cId="898712602" sldId="256"/>
+            <ac:cxnSpMk id="39" creationId="{B3594B2E-6D0B-447D-975A-54D31C66E7CA}"/>
+          </ac:cxnSpMkLst>
+        </pc:cxnChg>
+        <pc:cxnChg chg="add mod">
+          <ac:chgData name="Vivian G" userId="217fb073e6d8a319" providerId="LiveId" clId="{897410AA-0F5F-498B-AF46-0BBA82E09B2A}" dt="2020-03-18T15:13:22.637" v="148" actId="14100"/>
+          <ac:cxnSpMkLst>
+            <pc:docMk/>
+            <pc:sldMk cId="898712602" sldId="256"/>
+            <ac:cxnSpMk id="42" creationId="{F5149114-A680-4536-BB33-63B2B107A752}"/>
+          </ac:cxnSpMkLst>
+        </pc:cxnChg>
+      </pc:sldChg>
+      <pc:sldChg chg="addSp modSp">
+        <pc:chgData name="Vivian G" userId="217fb073e6d8a319" providerId="LiveId" clId="{897410AA-0F5F-498B-AF46-0BBA82E09B2A}" dt="2020-03-18T15:15:07.733" v="232" actId="20577"/>
+        <pc:sldMkLst>
+          <pc:docMk/>
+          <pc:sldMk cId="3611996577" sldId="260"/>
+        </pc:sldMkLst>
+        <pc:spChg chg="add mod">
+          <ac:chgData name="Vivian G" userId="217fb073e6d8a319" providerId="LiveId" clId="{897410AA-0F5F-498B-AF46-0BBA82E09B2A}" dt="2020-03-18T15:14:58.533" v="229" actId="14100"/>
+          <ac:spMkLst>
+            <pc:docMk/>
+            <pc:sldMk cId="3611996577" sldId="260"/>
+            <ac:spMk id="19" creationId="{5F07E469-C343-4E58-8551-0D97F8DE0072}"/>
+          </ac:spMkLst>
+        </pc:spChg>
+        <pc:spChg chg="mod">
+          <ac:chgData name="Vivian G" userId="217fb073e6d8a319" providerId="LiveId" clId="{897410AA-0F5F-498B-AF46-0BBA82E09B2A}" dt="2020-03-18T15:15:07.733" v="232" actId="20577"/>
+          <ac:spMkLst>
+            <pc:docMk/>
+            <pc:sldMk cId="3611996577" sldId="260"/>
+            <ac:spMk id="44" creationId="{D65E78B7-091C-4B94-8628-AAF4E91692C8}"/>
+          </ac:spMkLst>
+        </pc:spChg>
+        <pc:cxnChg chg="add mod">
+          <ac:chgData name="Vivian G" userId="217fb073e6d8a319" providerId="LiveId" clId="{897410AA-0F5F-498B-AF46-0BBA82E09B2A}" dt="2020-03-18T15:14:58.533" v="229" actId="14100"/>
+          <ac:cxnSpMkLst>
+            <pc:docMk/>
+            <pc:sldMk cId="3611996577" sldId="260"/>
+            <ac:cxnSpMk id="20" creationId="{4098C2F1-7152-4DF4-A779-CA8856966C2A}"/>
+          </ac:cxnSpMkLst>
+        </pc:cxnChg>
+      </pc:sldChg>
+    </pc:docChg>
+  </pc:docChgLst>
+</pc:chgInfo>
 </file>
 
 <file path=ppt/slideLayouts/slideLayout1.xml><?xml version="1.0" encoding="utf-8"?>
@@ -137,7 +424,7 @@
           <p:cNvPr id="2" name="Titre 1">
             <a:extLst>
               <a:ext uri="{FF2B5EF4-FFF2-40B4-BE49-F238E27FC236}">
-                <a16:creationId xmlns:a16="http://schemas.microsoft.com/office/drawing/2014/main" xmlns="" id="{BD7B1E89-298C-4278-8A79-A8A701A5F3B5}"/>
+                <a16:creationId xmlns:a16="http://schemas.microsoft.com/office/drawing/2014/main" id="{BD7B1E89-298C-4278-8A79-A8A701A5F3B5}"/>
               </a:ext>
             </a:extLst>
           </p:cNvPr>
@@ -174,7 +461,7 @@
           <p:cNvPr id="3" name="Sous-titre 2">
             <a:extLst>
               <a:ext uri="{FF2B5EF4-FFF2-40B4-BE49-F238E27FC236}">
-                <a16:creationId xmlns:a16="http://schemas.microsoft.com/office/drawing/2014/main" xmlns="" id="{DBDC2D10-4FB1-4301-8896-FEF2DD05A657}"/>
+                <a16:creationId xmlns:a16="http://schemas.microsoft.com/office/drawing/2014/main" id="{DBDC2D10-4FB1-4301-8896-FEF2DD05A657}"/>
               </a:ext>
             </a:extLst>
           </p:cNvPr>
@@ -244,7 +531,7 @@
           <p:cNvPr id="4" name="Espace réservé de la date 3">
             <a:extLst>
               <a:ext uri="{FF2B5EF4-FFF2-40B4-BE49-F238E27FC236}">
-                <a16:creationId xmlns:a16="http://schemas.microsoft.com/office/drawing/2014/main" xmlns="" id="{57475615-6A22-4903-B914-A5021271AC41}"/>
+                <a16:creationId xmlns:a16="http://schemas.microsoft.com/office/drawing/2014/main" id="{57475615-6A22-4903-B914-A5021271AC41}"/>
               </a:ext>
             </a:extLst>
           </p:cNvPr>
@@ -274,7 +561,7 @@
           <p:cNvPr id="5" name="Espace réservé du pied de page 4">
             <a:extLst>
               <a:ext uri="{FF2B5EF4-FFF2-40B4-BE49-F238E27FC236}">
-                <a16:creationId xmlns:a16="http://schemas.microsoft.com/office/drawing/2014/main" xmlns="" id="{86C58B26-BCE5-44D6-B934-9DE53AFF9D09}"/>
+                <a16:creationId xmlns:a16="http://schemas.microsoft.com/office/drawing/2014/main" id="{86C58B26-BCE5-44D6-B934-9DE53AFF9D09}"/>
               </a:ext>
             </a:extLst>
           </p:cNvPr>
@@ -299,7 +586,7 @@
           <p:cNvPr id="6" name="Espace réservé du numéro de diapositive 5">
             <a:extLst>
               <a:ext uri="{FF2B5EF4-FFF2-40B4-BE49-F238E27FC236}">
-                <a16:creationId xmlns:a16="http://schemas.microsoft.com/office/drawing/2014/main" xmlns="" id="{AC7507C7-0F22-49C6-8EDB-44F634302C27}"/>
+                <a16:creationId xmlns:a16="http://schemas.microsoft.com/office/drawing/2014/main" id="{AC7507C7-0F22-49C6-8EDB-44F634302C27}"/>
               </a:ext>
             </a:extLst>
           </p:cNvPr>
@@ -327,7 +614,7 @@
     </p:spTree>
     <p:extLst>
       <p:ext uri="{BB962C8B-B14F-4D97-AF65-F5344CB8AC3E}">
-        <p14:creationId xmlns:p14="http://schemas.microsoft.com/office/powerpoint/2010/main" xmlns="" val="562850590"/>
+        <p14:creationId xmlns:p14="http://schemas.microsoft.com/office/powerpoint/2010/main" val="562850590"/>
       </p:ext>
     </p:extLst>
   </p:cSld>
@@ -359,7 +646,7 @@
           <p:cNvPr id="2" name="Titre 1">
             <a:extLst>
               <a:ext uri="{FF2B5EF4-FFF2-40B4-BE49-F238E27FC236}">
-                <a16:creationId xmlns:a16="http://schemas.microsoft.com/office/drawing/2014/main" xmlns="" id="{B454CB3A-66B9-439C-8299-741350A795BF}"/>
+                <a16:creationId xmlns:a16="http://schemas.microsoft.com/office/drawing/2014/main" id="{B454CB3A-66B9-439C-8299-741350A795BF}"/>
               </a:ext>
             </a:extLst>
           </p:cNvPr>
@@ -387,7 +674,7 @@
           <p:cNvPr id="3" name="Espace réservé du texte vertical 2">
             <a:extLst>
               <a:ext uri="{FF2B5EF4-FFF2-40B4-BE49-F238E27FC236}">
-                <a16:creationId xmlns:a16="http://schemas.microsoft.com/office/drawing/2014/main" xmlns="" id="{BA009A03-52BF-4467-9927-33E12C42C86E}"/>
+                <a16:creationId xmlns:a16="http://schemas.microsoft.com/office/drawing/2014/main" id="{BA009A03-52BF-4467-9927-33E12C42C86E}"/>
               </a:ext>
             </a:extLst>
           </p:cNvPr>
@@ -444,7 +731,7 @@
           <p:cNvPr id="4" name="Espace réservé de la date 3">
             <a:extLst>
               <a:ext uri="{FF2B5EF4-FFF2-40B4-BE49-F238E27FC236}">
-                <a16:creationId xmlns:a16="http://schemas.microsoft.com/office/drawing/2014/main" xmlns="" id="{B375822B-4BD7-44ED-8B9C-34AA2BA5E2CB}"/>
+                <a16:creationId xmlns:a16="http://schemas.microsoft.com/office/drawing/2014/main" id="{B375822B-4BD7-44ED-8B9C-34AA2BA5E2CB}"/>
               </a:ext>
             </a:extLst>
           </p:cNvPr>
@@ -474,7 +761,7 @@
           <p:cNvPr id="5" name="Espace réservé du pied de page 4">
             <a:extLst>
               <a:ext uri="{FF2B5EF4-FFF2-40B4-BE49-F238E27FC236}">
-                <a16:creationId xmlns:a16="http://schemas.microsoft.com/office/drawing/2014/main" xmlns="" id="{EBE3C8CD-9C69-4E9E-82B4-AD81584EDEBD}"/>
+                <a16:creationId xmlns:a16="http://schemas.microsoft.com/office/drawing/2014/main" id="{EBE3C8CD-9C69-4E9E-82B4-AD81584EDEBD}"/>
               </a:ext>
             </a:extLst>
           </p:cNvPr>
@@ -499,7 +786,7 @@
           <p:cNvPr id="6" name="Espace réservé du numéro de diapositive 5">
             <a:extLst>
               <a:ext uri="{FF2B5EF4-FFF2-40B4-BE49-F238E27FC236}">
-                <a16:creationId xmlns:a16="http://schemas.microsoft.com/office/drawing/2014/main" xmlns="" id="{FC42DBD0-810A-4832-863C-83EC8C52618A}"/>
+                <a16:creationId xmlns:a16="http://schemas.microsoft.com/office/drawing/2014/main" id="{FC42DBD0-810A-4832-863C-83EC8C52618A}"/>
               </a:ext>
             </a:extLst>
           </p:cNvPr>
@@ -527,7 +814,7 @@
     </p:spTree>
     <p:extLst>
       <p:ext uri="{BB962C8B-B14F-4D97-AF65-F5344CB8AC3E}">
-        <p14:creationId xmlns:p14="http://schemas.microsoft.com/office/powerpoint/2010/main" xmlns="" val="3824725464"/>
+        <p14:creationId xmlns:p14="http://schemas.microsoft.com/office/powerpoint/2010/main" val="3824725464"/>
       </p:ext>
     </p:extLst>
   </p:cSld>
@@ -559,7 +846,7 @@
           <p:cNvPr id="2" name="Titre vertical 1">
             <a:extLst>
               <a:ext uri="{FF2B5EF4-FFF2-40B4-BE49-F238E27FC236}">
-                <a16:creationId xmlns:a16="http://schemas.microsoft.com/office/drawing/2014/main" xmlns="" id="{52A2B635-0129-4C4B-AB1E-720FD492BFEE}"/>
+                <a16:creationId xmlns:a16="http://schemas.microsoft.com/office/drawing/2014/main" id="{52A2B635-0129-4C4B-AB1E-720FD492BFEE}"/>
               </a:ext>
             </a:extLst>
           </p:cNvPr>
@@ -592,7 +879,7 @@
           <p:cNvPr id="3" name="Espace réservé du texte vertical 2">
             <a:extLst>
               <a:ext uri="{FF2B5EF4-FFF2-40B4-BE49-F238E27FC236}">
-                <a16:creationId xmlns:a16="http://schemas.microsoft.com/office/drawing/2014/main" xmlns="" id="{7D83856D-C0DF-4010-8D67-F44163118A92}"/>
+                <a16:creationId xmlns:a16="http://schemas.microsoft.com/office/drawing/2014/main" id="{7D83856D-C0DF-4010-8D67-F44163118A92}"/>
               </a:ext>
             </a:extLst>
           </p:cNvPr>
@@ -654,7 +941,7 @@
           <p:cNvPr id="4" name="Espace réservé de la date 3">
             <a:extLst>
               <a:ext uri="{FF2B5EF4-FFF2-40B4-BE49-F238E27FC236}">
-                <a16:creationId xmlns:a16="http://schemas.microsoft.com/office/drawing/2014/main" xmlns="" id="{D860C269-3A7E-419C-9BE5-5BE079F8A8E9}"/>
+                <a16:creationId xmlns:a16="http://schemas.microsoft.com/office/drawing/2014/main" id="{D860C269-3A7E-419C-9BE5-5BE079F8A8E9}"/>
               </a:ext>
             </a:extLst>
           </p:cNvPr>
@@ -684,7 +971,7 @@
           <p:cNvPr id="5" name="Espace réservé du pied de page 4">
             <a:extLst>
               <a:ext uri="{FF2B5EF4-FFF2-40B4-BE49-F238E27FC236}">
-                <a16:creationId xmlns:a16="http://schemas.microsoft.com/office/drawing/2014/main" xmlns="" id="{2E4BF4AD-4C0A-4B01-B04E-5F486B28E2E1}"/>
+                <a16:creationId xmlns:a16="http://schemas.microsoft.com/office/drawing/2014/main" id="{2E4BF4AD-4C0A-4B01-B04E-5F486B28E2E1}"/>
               </a:ext>
             </a:extLst>
           </p:cNvPr>
@@ -709,7 +996,7 @@
           <p:cNvPr id="6" name="Espace réservé du numéro de diapositive 5">
             <a:extLst>
               <a:ext uri="{FF2B5EF4-FFF2-40B4-BE49-F238E27FC236}">
-                <a16:creationId xmlns:a16="http://schemas.microsoft.com/office/drawing/2014/main" xmlns="" id="{F5E0D563-70FF-4550-9DB9-57EB7E0B54FF}"/>
+                <a16:creationId xmlns:a16="http://schemas.microsoft.com/office/drawing/2014/main" id="{F5E0D563-70FF-4550-9DB9-57EB7E0B54FF}"/>
               </a:ext>
             </a:extLst>
           </p:cNvPr>
@@ -737,7 +1024,7 @@
     </p:spTree>
     <p:extLst>
       <p:ext uri="{BB962C8B-B14F-4D97-AF65-F5344CB8AC3E}">
-        <p14:creationId xmlns:p14="http://schemas.microsoft.com/office/powerpoint/2010/main" xmlns="" val="1754518717"/>
+        <p14:creationId xmlns:p14="http://schemas.microsoft.com/office/powerpoint/2010/main" val="1754518717"/>
       </p:ext>
     </p:extLst>
   </p:cSld>
@@ -769,7 +1056,7 @@
           <p:cNvPr id="2" name="Titre 1">
             <a:extLst>
               <a:ext uri="{FF2B5EF4-FFF2-40B4-BE49-F238E27FC236}">
-                <a16:creationId xmlns:a16="http://schemas.microsoft.com/office/drawing/2014/main" xmlns="" id="{DAF3313E-CED4-407A-A0CE-EDF7572171F9}"/>
+                <a16:creationId xmlns:a16="http://schemas.microsoft.com/office/drawing/2014/main" id="{DAF3313E-CED4-407A-A0CE-EDF7572171F9}"/>
               </a:ext>
             </a:extLst>
           </p:cNvPr>
@@ -797,7 +1084,7 @@
           <p:cNvPr id="3" name="Espace réservé du contenu 2">
             <a:extLst>
               <a:ext uri="{FF2B5EF4-FFF2-40B4-BE49-F238E27FC236}">
-                <a16:creationId xmlns:a16="http://schemas.microsoft.com/office/drawing/2014/main" xmlns="" id="{3D1CD724-7C61-4525-A100-ACC2ECEDC2B6}"/>
+                <a16:creationId xmlns:a16="http://schemas.microsoft.com/office/drawing/2014/main" id="{3D1CD724-7C61-4525-A100-ACC2ECEDC2B6}"/>
               </a:ext>
             </a:extLst>
           </p:cNvPr>
@@ -854,7 +1141,7 @@
           <p:cNvPr id="4" name="Espace réservé de la date 3">
             <a:extLst>
               <a:ext uri="{FF2B5EF4-FFF2-40B4-BE49-F238E27FC236}">
-                <a16:creationId xmlns:a16="http://schemas.microsoft.com/office/drawing/2014/main" xmlns="" id="{AA30608F-28D9-4A2B-ABC0-384F5010A4C9}"/>
+                <a16:creationId xmlns:a16="http://schemas.microsoft.com/office/drawing/2014/main" id="{AA30608F-28D9-4A2B-ABC0-384F5010A4C9}"/>
               </a:ext>
             </a:extLst>
           </p:cNvPr>
@@ -884,7 +1171,7 @@
           <p:cNvPr id="5" name="Espace réservé du pied de page 4">
             <a:extLst>
               <a:ext uri="{FF2B5EF4-FFF2-40B4-BE49-F238E27FC236}">
-                <a16:creationId xmlns:a16="http://schemas.microsoft.com/office/drawing/2014/main" xmlns="" id="{EE82752E-B91C-4382-A66E-F58E57F349E0}"/>
+                <a16:creationId xmlns:a16="http://schemas.microsoft.com/office/drawing/2014/main" id="{EE82752E-B91C-4382-A66E-F58E57F349E0}"/>
               </a:ext>
             </a:extLst>
           </p:cNvPr>
@@ -909,7 +1196,7 @@
           <p:cNvPr id="6" name="Espace réservé du numéro de diapositive 5">
             <a:extLst>
               <a:ext uri="{FF2B5EF4-FFF2-40B4-BE49-F238E27FC236}">
-                <a16:creationId xmlns:a16="http://schemas.microsoft.com/office/drawing/2014/main" xmlns="" id="{F4BC79EA-1CA3-46D1-BAAB-24B41E89A618}"/>
+                <a16:creationId xmlns:a16="http://schemas.microsoft.com/office/drawing/2014/main" id="{F4BC79EA-1CA3-46D1-BAAB-24B41E89A618}"/>
               </a:ext>
             </a:extLst>
           </p:cNvPr>
@@ -937,7 +1224,7 @@
     </p:spTree>
     <p:extLst>
       <p:ext uri="{BB962C8B-B14F-4D97-AF65-F5344CB8AC3E}">
-        <p14:creationId xmlns:p14="http://schemas.microsoft.com/office/powerpoint/2010/main" xmlns="" val="2829087679"/>
+        <p14:creationId xmlns:p14="http://schemas.microsoft.com/office/powerpoint/2010/main" val="2829087679"/>
       </p:ext>
     </p:extLst>
   </p:cSld>
@@ -969,7 +1256,7 @@
           <p:cNvPr id="2" name="Titre 1">
             <a:extLst>
               <a:ext uri="{FF2B5EF4-FFF2-40B4-BE49-F238E27FC236}">
-                <a16:creationId xmlns:a16="http://schemas.microsoft.com/office/drawing/2014/main" xmlns="" id="{8F030A88-41A0-4DCD-8F71-2D587F12CD63}"/>
+                <a16:creationId xmlns:a16="http://schemas.microsoft.com/office/drawing/2014/main" id="{8F030A88-41A0-4DCD-8F71-2D587F12CD63}"/>
               </a:ext>
             </a:extLst>
           </p:cNvPr>
@@ -1006,7 +1293,7 @@
           <p:cNvPr id="3" name="Espace réservé du texte 2">
             <a:extLst>
               <a:ext uri="{FF2B5EF4-FFF2-40B4-BE49-F238E27FC236}">
-                <a16:creationId xmlns:a16="http://schemas.microsoft.com/office/drawing/2014/main" xmlns="" id="{1D1BA862-494C-4E9A-95BF-961110BBF7EE}"/>
+                <a16:creationId xmlns:a16="http://schemas.microsoft.com/office/drawing/2014/main" id="{1D1BA862-494C-4E9A-95BF-961110BBF7EE}"/>
               </a:ext>
             </a:extLst>
           </p:cNvPr>
@@ -1131,7 +1418,7 @@
           <p:cNvPr id="4" name="Espace réservé de la date 3">
             <a:extLst>
               <a:ext uri="{FF2B5EF4-FFF2-40B4-BE49-F238E27FC236}">
-                <a16:creationId xmlns:a16="http://schemas.microsoft.com/office/drawing/2014/main" xmlns="" id="{DA3793BB-DA2B-4C86-901A-805885856E68}"/>
+                <a16:creationId xmlns:a16="http://schemas.microsoft.com/office/drawing/2014/main" id="{DA3793BB-DA2B-4C86-901A-805885856E68}"/>
               </a:ext>
             </a:extLst>
           </p:cNvPr>
@@ -1161,7 +1448,7 @@
           <p:cNvPr id="5" name="Espace réservé du pied de page 4">
             <a:extLst>
               <a:ext uri="{FF2B5EF4-FFF2-40B4-BE49-F238E27FC236}">
-                <a16:creationId xmlns:a16="http://schemas.microsoft.com/office/drawing/2014/main" xmlns="" id="{7BC9C1F0-2245-4AF9-A8AE-8AB56088F0D2}"/>
+                <a16:creationId xmlns:a16="http://schemas.microsoft.com/office/drawing/2014/main" id="{7BC9C1F0-2245-4AF9-A8AE-8AB56088F0D2}"/>
               </a:ext>
             </a:extLst>
           </p:cNvPr>
@@ -1186,7 +1473,7 @@
           <p:cNvPr id="6" name="Espace réservé du numéro de diapositive 5">
             <a:extLst>
               <a:ext uri="{FF2B5EF4-FFF2-40B4-BE49-F238E27FC236}">
-                <a16:creationId xmlns:a16="http://schemas.microsoft.com/office/drawing/2014/main" xmlns="" id="{E3A8C094-4C4A-47DA-8F09-495E2A5F4B5E}"/>
+                <a16:creationId xmlns:a16="http://schemas.microsoft.com/office/drawing/2014/main" id="{E3A8C094-4C4A-47DA-8F09-495E2A5F4B5E}"/>
               </a:ext>
             </a:extLst>
           </p:cNvPr>
@@ -1214,7 +1501,7 @@
     </p:spTree>
     <p:extLst>
       <p:ext uri="{BB962C8B-B14F-4D97-AF65-F5344CB8AC3E}">
-        <p14:creationId xmlns:p14="http://schemas.microsoft.com/office/powerpoint/2010/main" xmlns="" val="814556263"/>
+        <p14:creationId xmlns:p14="http://schemas.microsoft.com/office/powerpoint/2010/main" val="814556263"/>
       </p:ext>
     </p:extLst>
   </p:cSld>
@@ -1246,7 +1533,7 @@
           <p:cNvPr id="2" name="Titre 1">
             <a:extLst>
               <a:ext uri="{FF2B5EF4-FFF2-40B4-BE49-F238E27FC236}">
-                <a16:creationId xmlns:a16="http://schemas.microsoft.com/office/drawing/2014/main" xmlns="" id="{546BCBBD-B05D-427A-B721-E84AEB80E369}"/>
+                <a16:creationId xmlns:a16="http://schemas.microsoft.com/office/drawing/2014/main" id="{546BCBBD-B05D-427A-B721-E84AEB80E369}"/>
               </a:ext>
             </a:extLst>
           </p:cNvPr>
@@ -1274,7 +1561,7 @@
           <p:cNvPr id="3" name="Espace réservé du contenu 2">
             <a:extLst>
               <a:ext uri="{FF2B5EF4-FFF2-40B4-BE49-F238E27FC236}">
-                <a16:creationId xmlns:a16="http://schemas.microsoft.com/office/drawing/2014/main" xmlns="" id="{43C54303-2CC6-41F1-B48A-5F6E0A69799A}"/>
+                <a16:creationId xmlns:a16="http://schemas.microsoft.com/office/drawing/2014/main" id="{43C54303-2CC6-41F1-B48A-5F6E0A69799A}"/>
               </a:ext>
             </a:extLst>
           </p:cNvPr>
@@ -1336,7 +1623,7 @@
           <p:cNvPr id="4" name="Espace réservé du contenu 3">
             <a:extLst>
               <a:ext uri="{FF2B5EF4-FFF2-40B4-BE49-F238E27FC236}">
-                <a16:creationId xmlns:a16="http://schemas.microsoft.com/office/drawing/2014/main" xmlns="" id="{061B7557-4E36-4BD5-B815-7F64BB8C9DF1}"/>
+                <a16:creationId xmlns:a16="http://schemas.microsoft.com/office/drawing/2014/main" id="{061B7557-4E36-4BD5-B815-7F64BB8C9DF1}"/>
               </a:ext>
             </a:extLst>
           </p:cNvPr>
@@ -1398,7 +1685,7 @@
           <p:cNvPr id="5" name="Espace réservé de la date 4">
             <a:extLst>
               <a:ext uri="{FF2B5EF4-FFF2-40B4-BE49-F238E27FC236}">
-                <a16:creationId xmlns:a16="http://schemas.microsoft.com/office/drawing/2014/main" xmlns="" id="{401EAFD6-474B-449F-95F6-FBADE4C7BAA1}"/>
+                <a16:creationId xmlns:a16="http://schemas.microsoft.com/office/drawing/2014/main" id="{401EAFD6-474B-449F-95F6-FBADE4C7BAA1}"/>
               </a:ext>
             </a:extLst>
           </p:cNvPr>
@@ -1428,7 +1715,7 @@
           <p:cNvPr id="6" name="Espace réservé du pied de page 5">
             <a:extLst>
               <a:ext uri="{FF2B5EF4-FFF2-40B4-BE49-F238E27FC236}">
-                <a16:creationId xmlns:a16="http://schemas.microsoft.com/office/drawing/2014/main" xmlns="" id="{C1A21AC6-87C7-4647-A7EF-9856389CABF3}"/>
+                <a16:creationId xmlns:a16="http://schemas.microsoft.com/office/drawing/2014/main" id="{C1A21AC6-87C7-4647-A7EF-9856389CABF3}"/>
               </a:ext>
             </a:extLst>
           </p:cNvPr>
@@ -1453,7 +1740,7 @@
           <p:cNvPr id="7" name="Espace réservé du numéro de diapositive 6">
             <a:extLst>
               <a:ext uri="{FF2B5EF4-FFF2-40B4-BE49-F238E27FC236}">
-                <a16:creationId xmlns:a16="http://schemas.microsoft.com/office/drawing/2014/main" xmlns="" id="{D4184DEC-8789-48BC-9D30-779D0D2E373F}"/>
+                <a16:creationId xmlns:a16="http://schemas.microsoft.com/office/drawing/2014/main" id="{D4184DEC-8789-48BC-9D30-779D0D2E373F}"/>
               </a:ext>
             </a:extLst>
           </p:cNvPr>
@@ -1481,7 +1768,7 @@
     </p:spTree>
     <p:extLst>
       <p:ext uri="{BB962C8B-B14F-4D97-AF65-F5344CB8AC3E}">
-        <p14:creationId xmlns:p14="http://schemas.microsoft.com/office/powerpoint/2010/main" xmlns="" val="1256147670"/>
+        <p14:creationId xmlns:p14="http://schemas.microsoft.com/office/powerpoint/2010/main" val="1256147670"/>
       </p:ext>
     </p:extLst>
   </p:cSld>
@@ -1513,7 +1800,7 @@
           <p:cNvPr id="2" name="Titre 1">
             <a:extLst>
               <a:ext uri="{FF2B5EF4-FFF2-40B4-BE49-F238E27FC236}">
-                <a16:creationId xmlns:a16="http://schemas.microsoft.com/office/drawing/2014/main" xmlns="" id="{E4DF5176-F8B2-4AD8-BA2C-30961ACDF667}"/>
+                <a16:creationId xmlns:a16="http://schemas.microsoft.com/office/drawing/2014/main" id="{E4DF5176-F8B2-4AD8-BA2C-30961ACDF667}"/>
               </a:ext>
             </a:extLst>
           </p:cNvPr>
@@ -1546,7 +1833,7 @@
           <p:cNvPr id="3" name="Espace réservé du texte 2">
             <a:extLst>
               <a:ext uri="{FF2B5EF4-FFF2-40B4-BE49-F238E27FC236}">
-                <a16:creationId xmlns:a16="http://schemas.microsoft.com/office/drawing/2014/main" xmlns="" id="{95BDE9BD-2E34-4A03-8B09-B97946A11C7A}"/>
+                <a16:creationId xmlns:a16="http://schemas.microsoft.com/office/drawing/2014/main" id="{95BDE9BD-2E34-4A03-8B09-B97946A11C7A}"/>
               </a:ext>
             </a:extLst>
           </p:cNvPr>
@@ -1617,7 +1904,7 @@
           <p:cNvPr id="4" name="Espace réservé du contenu 3">
             <a:extLst>
               <a:ext uri="{FF2B5EF4-FFF2-40B4-BE49-F238E27FC236}">
-                <a16:creationId xmlns:a16="http://schemas.microsoft.com/office/drawing/2014/main" xmlns="" id="{4FE8CE07-1CDF-404B-AF3C-40A4457FF800}"/>
+                <a16:creationId xmlns:a16="http://schemas.microsoft.com/office/drawing/2014/main" id="{4FE8CE07-1CDF-404B-AF3C-40A4457FF800}"/>
               </a:ext>
             </a:extLst>
           </p:cNvPr>
@@ -1679,7 +1966,7 @@
           <p:cNvPr id="5" name="Espace réservé du texte 4">
             <a:extLst>
               <a:ext uri="{FF2B5EF4-FFF2-40B4-BE49-F238E27FC236}">
-                <a16:creationId xmlns:a16="http://schemas.microsoft.com/office/drawing/2014/main" xmlns="" id="{C13C32E1-4530-4573-9952-05AF55221764}"/>
+                <a16:creationId xmlns:a16="http://schemas.microsoft.com/office/drawing/2014/main" id="{C13C32E1-4530-4573-9952-05AF55221764}"/>
               </a:ext>
             </a:extLst>
           </p:cNvPr>
@@ -1750,7 +2037,7 @@
           <p:cNvPr id="6" name="Espace réservé du contenu 5">
             <a:extLst>
               <a:ext uri="{FF2B5EF4-FFF2-40B4-BE49-F238E27FC236}">
-                <a16:creationId xmlns:a16="http://schemas.microsoft.com/office/drawing/2014/main" xmlns="" id="{022E2D77-4C11-4FA6-B8A6-1E9FDABEE96C}"/>
+                <a16:creationId xmlns:a16="http://schemas.microsoft.com/office/drawing/2014/main" id="{022E2D77-4C11-4FA6-B8A6-1E9FDABEE96C}"/>
               </a:ext>
             </a:extLst>
           </p:cNvPr>
@@ -1812,7 +2099,7 @@
           <p:cNvPr id="7" name="Espace réservé de la date 6">
             <a:extLst>
               <a:ext uri="{FF2B5EF4-FFF2-40B4-BE49-F238E27FC236}">
-                <a16:creationId xmlns:a16="http://schemas.microsoft.com/office/drawing/2014/main" xmlns="" id="{5177CF0C-FCF8-4210-8860-A8FEDDDE25AF}"/>
+                <a16:creationId xmlns:a16="http://schemas.microsoft.com/office/drawing/2014/main" id="{5177CF0C-FCF8-4210-8860-A8FEDDDE25AF}"/>
               </a:ext>
             </a:extLst>
           </p:cNvPr>
@@ -1842,7 +2129,7 @@
           <p:cNvPr id="8" name="Espace réservé du pied de page 7">
             <a:extLst>
               <a:ext uri="{FF2B5EF4-FFF2-40B4-BE49-F238E27FC236}">
-                <a16:creationId xmlns:a16="http://schemas.microsoft.com/office/drawing/2014/main" xmlns="" id="{5695BDB8-DDBD-4FD8-B53F-D6612655335C}"/>
+                <a16:creationId xmlns:a16="http://schemas.microsoft.com/office/drawing/2014/main" id="{5695BDB8-DDBD-4FD8-B53F-D6612655335C}"/>
               </a:ext>
             </a:extLst>
           </p:cNvPr>
@@ -1867,7 +2154,7 @@
           <p:cNvPr id="9" name="Espace réservé du numéro de diapositive 8">
             <a:extLst>
               <a:ext uri="{FF2B5EF4-FFF2-40B4-BE49-F238E27FC236}">
-                <a16:creationId xmlns:a16="http://schemas.microsoft.com/office/drawing/2014/main" xmlns="" id="{A26793C5-0FB8-49DF-92D0-7E6F074F3BA4}"/>
+                <a16:creationId xmlns:a16="http://schemas.microsoft.com/office/drawing/2014/main" id="{A26793C5-0FB8-49DF-92D0-7E6F074F3BA4}"/>
               </a:ext>
             </a:extLst>
           </p:cNvPr>
@@ -1895,7 +2182,7 @@
     </p:spTree>
     <p:extLst>
       <p:ext uri="{BB962C8B-B14F-4D97-AF65-F5344CB8AC3E}">
-        <p14:creationId xmlns:p14="http://schemas.microsoft.com/office/powerpoint/2010/main" xmlns="" val="100849043"/>
+        <p14:creationId xmlns:p14="http://schemas.microsoft.com/office/powerpoint/2010/main" val="100849043"/>
       </p:ext>
     </p:extLst>
   </p:cSld>
@@ -1927,7 +2214,7 @@
           <p:cNvPr id="2" name="Titre 1">
             <a:extLst>
               <a:ext uri="{FF2B5EF4-FFF2-40B4-BE49-F238E27FC236}">
-                <a16:creationId xmlns:a16="http://schemas.microsoft.com/office/drawing/2014/main" xmlns="" id="{BBC34DBD-A4FD-4CF4-97C4-DC99FD0B0569}"/>
+                <a16:creationId xmlns:a16="http://schemas.microsoft.com/office/drawing/2014/main" id="{BBC34DBD-A4FD-4CF4-97C4-DC99FD0B0569}"/>
               </a:ext>
             </a:extLst>
           </p:cNvPr>
@@ -1955,7 +2242,7 @@
           <p:cNvPr id="3" name="Espace réservé de la date 2">
             <a:extLst>
               <a:ext uri="{FF2B5EF4-FFF2-40B4-BE49-F238E27FC236}">
-                <a16:creationId xmlns:a16="http://schemas.microsoft.com/office/drawing/2014/main" xmlns="" id="{B951241C-BEB0-4741-9DD6-A2DB643F6DBC}"/>
+                <a16:creationId xmlns:a16="http://schemas.microsoft.com/office/drawing/2014/main" id="{B951241C-BEB0-4741-9DD6-A2DB643F6DBC}"/>
               </a:ext>
             </a:extLst>
           </p:cNvPr>
@@ -1985,7 +2272,7 @@
           <p:cNvPr id="4" name="Espace réservé du pied de page 3">
             <a:extLst>
               <a:ext uri="{FF2B5EF4-FFF2-40B4-BE49-F238E27FC236}">
-                <a16:creationId xmlns:a16="http://schemas.microsoft.com/office/drawing/2014/main" xmlns="" id="{CC5075F0-7F31-4ECE-85B8-5584D613E989}"/>
+                <a16:creationId xmlns:a16="http://schemas.microsoft.com/office/drawing/2014/main" id="{CC5075F0-7F31-4ECE-85B8-5584D613E989}"/>
               </a:ext>
             </a:extLst>
           </p:cNvPr>
@@ -2010,7 +2297,7 @@
           <p:cNvPr id="5" name="Espace réservé du numéro de diapositive 4">
             <a:extLst>
               <a:ext uri="{FF2B5EF4-FFF2-40B4-BE49-F238E27FC236}">
-                <a16:creationId xmlns:a16="http://schemas.microsoft.com/office/drawing/2014/main" xmlns="" id="{B6F1B1ED-2A25-489A-A66F-657A26F7F44D}"/>
+                <a16:creationId xmlns:a16="http://schemas.microsoft.com/office/drawing/2014/main" id="{B6F1B1ED-2A25-489A-A66F-657A26F7F44D}"/>
               </a:ext>
             </a:extLst>
           </p:cNvPr>
@@ -2038,7 +2325,7 @@
     </p:spTree>
     <p:extLst>
       <p:ext uri="{BB962C8B-B14F-4D97-AF65-F5344CB8AC3E}">
-        <p14:creationId xmlns:p14="http://schemas.microsoft.com/office/powerpoint/2010/main" xmlns="" val="704394106"/>
+        <p14:creationId xmlns:p14="http://schemas.microsoft.com/office/powerpoint/2010/main" val="704394106"/>
       </p:ext>
     </p:extLst>
   </p:cSld>
@@ -2070,7 +2357,7 @@
           <p:cNvPr id="2" name="Espace réservé de la date 1">
             <a:extLst>
               <a:ext uri="{FF2B5EF4-FFF2-40B4-BE49-F238E27FC236}">
-                <a16:creationId xmlns:a16="http://schemas.microsoft.com/office/drawing/2014/main" xmlns="" id="{B1CA3D3A-D380-4CF7-A95D-94D5D0177F10}"/>
+                <a16:creationId xmlns:a16="http://schemas.microsoft.com/office/drawing/2014/main" id="{B1CA3D3A-D380-4CF7-A95D-94D5D0177F10}"/>
               </a:ext>
             </a:extLst>
           </p:cNvPr>
@@ -2100,7 +2387,7 @@
           <p:cNvPr id="3" name="Espace réservé du pied de page 2">
             <a:extLst>
               <a:ext uri="{FF2B5EF4-FFF2-40B4-BE49-F238E27FC236}">
-                <a16:creationId xmlns:a16="http://schemas.microsoft.com/office/drawing/2014/main" xmlns="" id="{BD4B41C4-C7EF-460F-83B8-11D03403F350}"/>
+                <a16:creationId xmlns:a16="http://schemas.microsoft.com/office/drawing/2014/main" id="{BD4B41C4-C7EF-460F-83B8-11D03403F350}"/>
               </a:ext>
             </a:extLst>
           </p:cNvPr>
@@ -2125,7 +2412,7 @@
           <p:cNvPr id="4" name="Espace réservé du numéro de diapositive 3">
             <a:extLst>
               <a:ext uri="{FF2B5EF4-FFF2-40B4-BE49-F238E27FC236}">
-                <a16:creationId xmlns:a16="http://schemas.microsoft.com/office/drawing/2014/main" xmlns="" id="{B6B4F88C-E1D4-4A72-BC7B-3BAA37955215}"/>
+                <a16:creationId xmlns:a16="http://schemas.microsoft.com/office/drawing/2014/main" id="{B6B4F88C-E1D4-4A72-BC7B-3BAA37955215}"/>
               </a:ext>
             </a:extLst>
           </p:cNvPr>
@@ -2153,7 +2440,7 @@
     </p:spTree>
     <p:extLst>
       <p:ext uri="{BB962C8B-B14F-4D97-AF65-F5344CB8AC3E}">
-        <p14:creationId xmlns:p14="http://schemas.microsoft.com/office/powerpoint/2010/main" xmlns="" val="1408975812"/>
+        <p14:creationId xmlns:p14="http://schemas.microsoft.com/office/powerpoint/2010/main" val="1408975812"/>
       </p:ext>
     </p:extLst>
   </p:cSld>
@@ -2185,7 +2472,7 @@
           <p:cNvPr id="2" name="Titre 1">
             <a:extLst>
               <a:ext uri="{FF2B5EF4-FFF2-40B4-BE49-F238E27FC236}">
-                <a16:creationId xmlns:a16="http://schemas.microsoft.com/office/drawing/2014/main" xmlns="" id="{35B0FB24-C169-4641-9B2C-2E21ADDAFBF3}"/>
+                <a16:creationId xmlns:a16="http://schemas.microsoft.com/office/drawing/2014/main" id="{35B0FB24-C169-4641-9B2C-2E21ADDAFBF3}"/>
               </a:ext>
             </a:extLst>
           </p:cNvPr>
@@ -2222,7 +2509,7 @@
           <p:cNvPr id="3" name="Espace réservé du contenu 2">
             <a:extLst>
               <a:ext uri="{FF2B5EF4-FFF2-40B4-BE49-F238E27FC236}">
-                <a16:creationId xmlns:a16="http://schemas.microsoft.com/office/drawing/2014/main" xmlns="" id="{59D92CDC-A46E-4FF0-BEC9-0F1C1E6B2C25}"/>
+                <a16:creationId xmlns:a16="http://schemas.microsoft.com/office/drawing/2014/main" id="{59D92CDC-A46E-4FF0-BEC9-0F1C1E6B2C25}"/>
               </a:ext>
             </a:extLst>
           </p:cNvPr>
@@ -2312,7 +2599,7 @@
           <p:cNvPr id="4" name="Espace réservé du texte 3">
             <a:extLst>
               <a:ext uri="{FF2B5EF4-FFF2-40B4-BE49-F238E27FC236}">
-                <a16:creationId xmlns:a16="http://schemas.microsoft.com/office/drawing/2014/main" xmlns="" id="{0C02E387-C1E6-421A-B1B1-DE55C5209B95}"/>
+                <a16:creationId xmlns:a16="http://schemas.microsoft.com/office/drawing/2014/main" id="{0C02E387-C1E6-421A-B1B1-DE55C5209B95}"/>
               </a:ext>
             </a:extLst>
           </p:cNvPr>
@@ -2383,7 +2670,7 @@
           <p:cNvPr id="5" name="Espace réservé de la date 4">
             <a:extLst>
               <a:ext uri="{FF2B5EF4-FFF2-40B4-BE49-F238E27FC236}">
-                <a16:creationId xmlns:a16="http://schemas.microsoft.com/office/drawing/2014/main" xmlns="" id="{703CFF5A-5D0A-42C1-BDD1-C4CBC32F15C5}"/>
+                <a16:creationId xmlns:a16="http://schemas.microsoft.com/office/drawing/2014/main" id="{703CFF5A-5D0A-42C1-BDD1-C4CBC32F15C5}"/>
               </a:ext>
             </a:extLst>
           </p:cNvPr>
@@ -2413,7 +2700,7 @@
           <p:cNvPr id="6" name="Espace réservé du pied de page 5">
             <a:extLst>
               <a:ext uri="{FF2B5EF4-FFF2-40B4-BE49-F238E27FC236}">
-                <a16:creationId xmlns:a16="http://schemas.microsoft.com/office/drawing/2014/main" xmlns="" id="{DB51658F-9BF1-48F8-96F4-3B85593A5653}"/>
+                <a16:creationId xmlns:a16="http://schemas.microsoft.com/office/drawing/2014/main" id="{DB51658F-9BF1-48F8-96F4-3B85593A5653}"/>
               </a:ext>
             </a:extLst>
           </p:cNvPr>
@@ -2438,7 +2725,7 @@
           <p:cNvPr id="7" name="Espace réservé du numéro de diapositive 6">
             <a:extLst>
               <a:ext uri="{FF2B5EF4-FFF2-40B4-BE49-F238E27FC236}">
-                <a16:creationId xmlns:a16="http://schemas.microsoft.com/office/drawing/2014/main" xmlns="" id="{7A926145-1743-456F-AEC3-3624854674C7}"/>
+                <a16:creationId xmlns:a16="http://schemas.microsoft.com/office/drawing/2014/main" id="{7A926145-1743-456F-AEC3-3624854674C7}"/>
               </a:ext>
             </a:extLst>
           </p:cNvPr>
@@ -2466,7 +2753,7 @@
     </p:spTree>
     <p:extLst>
       <p:ext uri="{BB962C8B-B14F-4D97-AF65-F5344CB8AC3E}">
-        <p14:creationId xmlns:p14="http://schemas.microsoft.com/office/powerpoint/2010/main" xmlns="" val="28627999"/>
+        <p14:creationId xmlns:p14="http://schemas.microsoft.com/office/powerpoint/2010/main" val="28627999"/>
       </p:ext>
     </p:extLst>
   </p:cSld>
@@ -2498,7 +2785,7 @@
           <p:cNvPr id="2" name="Titre 1">
             <a:extLst>
               <a:ext uri="{FF2B5EF4-FFF2-40B4-BE49-F238E27FC236}">
-                <a16:creationId xmlns:a16="http://schemas.microsoft.com/office/drawing/2014/main" xmlns="" id="{8503F387-304E-4928-9E1C-D051A7BD1106}"/>
+                <a16:creationId xmlns:a16="http://schemas.microsoft.com/office/drawing/2014/main" id="{8503F387-304E-4928-9E1C-D051A7BD1106}"/>
               </a:ext>
             </a:extLst>
           </p:cNvPr>
@@ -2535,7 +2822,7 @@
           <p:cNvPr id="3" name="Espace réservé pour une image  2">
             <a:extLst>
               <a:ext uri="{FF2B5EF4-FFF2-40B4-BE49-F238E27FC236}">
-                <a16:creationId xmlns:a16="http://schemas.microsoft.com/office/drawing/2014/main" xmlns="" id="{9E30878E-8263-4D5A-8A86-321080A52D3A}"/>
+                <a16:creationId xmlns:a16="http://schemas.microsoft.com/office/drawing/2014/main" id="{9E30878E-8263-4D5A-8A86-321080A52D3A}"/>
               </a:ext>
             </a:extLst>
           </p:cNvPr>
@@ -2602,7 +2889,7 @@
           <p:cNvPr id="4" name="Espace réservé du texte 3">
             <a:extLst>
               <a:ext uri="{FF2B5EF4-FFF2-40B4-BE49-F238E27FC236}">
-                <a16:creationId xmlns:a16="http://schemas.microsoft.com/office/drawing/2014/main" xmlns="" id="{F8CCDAF2-A575-4BA0-AEA2-C7ED973B89A7}"/>
+                <a16:creationId xmlns:a16="http://schemas.microsoft.com/office/drawing/2014/main" id="{F8CCDAF2-A575-4BA0-AEA2-C7ED973B89A7}"/>
               </a:ext>
             </a:extLst>
           </p:cNvPr>
@@ -2673,7 +2960,7 @@
           <p:cNvPr id="5" name="Espace réservé de la date 4">
             <a:extLst>
               <a:ext uri="{FF2B5EF4-FFF2-40B4-BE49-F238E27FC236}">
-                <a16:creationId xmlns:a16="http://schemas.microsoft.com/office/drawing/2014/main" xmlns="" id="{FD8961A6-05F9-42EC-8DAC-6354AC8523B3}"/>
+                <a16:creationId xmlns:a16="http://schemas.microsoft.com/office/drawing/2014/main" id="{FD8961A6-05F9-42EC-8DAC-6354AC8523B3}"/>
               </a:ext>
             </a:extLst>
           </p:cNvPr>
@@ -2703,7 +2990,7 @@
           <p:cNvPr id="6" name="Espace réservé du pied de page 5">
             <a:extLst>
               <a:ext uri="{FF2B5EF4-FFF2-40B4-BE49-F238E27FC236}">
-                <a16:creationId xmlns:a16="http://schemas.microsoft.com/office/drawing/2014/main" xmlns="" id="{79EFF77B-54BD-4C60-B439-BA80F677F9C4}"/>
+                <a16:creationId xmlns:a16="http://schemas.microsoft.com/office/drawing/2014/main" id="{79EFF77B-54BD-4C60-B439-BA80F677F9C4}"/>
               </a:ext>
             </a:extLst>
           </p:cNvPr>
@@ -2728,7 +3015,7 @@
           <p:cNvPr id="7" name="Espace réservé du numéro de diapositive 6">
             <a:extLst>
               <a:ext uri="{FF2B5EF4-FFF2-40B4-BE49-F238E27FC236}">
-                <a16:creationId xmlns:a16="http://schemas.microsoft.com/office/drawing/2014/main" xmlns="" id="{BC35C3A4-5608-4634-8450-0A276EC7F4AD}"/>
+                <a16:creationId xmlns:a16="http://schemas.microsoft.com/office/drawing/2014/main" id="{BC35C3A4-5608-4634-8450-0A276EC7F4AD}"/>
               </a:ext>
             </a:extLst>
           </p:cNvPr>
@@ -2756,7 +3043,7 @@
     </p:spTree>
     <p:extLst>
       <p:ext uri="{BB962C8B-B14F-4D97-AF65-F5344CB8AC3E}">
-        <p14:creationId xmlns:p14="http://schemas.microsoft.com/office/powerpoint/2010/main" xmlns="" val="2322846040"/>
+        <p14:creationId xmlns:p14="http://schemas.microsoft.com/office/powerpoint/2010/main" val="2322846040"/>
       </p:ext>
     </p:extLst>
   </p:cSld>
@@ -2793,7 +3080,7 @@
           <p:cNvPr id="2" name="Espace réservé du titre 1">
             <a:extLst>
               <a:ext uri="{FF2B5EF4-FFF2-40B4-BE49-F238E27FC236}">
-                <a16:creationId xmlns:a16="http://schemas.microsoft.com/office/drawing/2014/main" xmlns="" id="{DDCAD460-43DD-47F1-B5BE-8EA207AD66D3}"/>
+                <a16:creationId xmlns:a16="http://schemas.microsoft.com/office/drawing/2014/main" id="{DDCAD460-43DD-47F1-B5BE-8EA207AD66D3}"/>
               </a:ext>
             </a:extLst>
           </p:cNvPr>
@@ -2831,7 +3118,7 @@
           <p:cNvPr id="3" name="Espace réservé du texte 2">
             <a:extLst>
               <a:ext uri="{FF2B5EF4-FFF2-40B4-BE49-F238E27FC236}">
-                <a16:creationId xmlns:a16="http://schemas.microsoft.com/office/drawing/2014/main" xmlns="" id="{12B5ADD7-A837-45BD-847E-1BE19A24246C}"/>
+                <a16:creationId xmlns:a16="http://schemas.microsoft.com/office/drawing/2014/main" id="{12B5ADD7-A837-45BD-847E-1BE19A24246C}"/>
               </a:ext>
             </a:extLst>
           </p:cNvPr>
@@ -2898,7 +3185,7 @@
           <p:cNvPr id="4" name="Espace réservé de la date 3">
             <a:extLst>
               <a:ext uri="{FF2B5EF4-FFF2-40B4-BE49-F238E27FC236}">
-                <a16:creationId xmlns:a16="http://schemas.microsoft.com/office/drawing/2014/main" xmlns="" id="{1B06FA78-C713-4DA6-9A34-F42DAE10FD78}"/>
+                <a16:creationId xmlns:a16="http://schemas.microsoft.com/office/drawing/2014/main" id="{1B06FA78-C713-4DA6-9A34-F42DAE10FD78}"/>
               </a:ext>
             </a:extLst>
           </p:cNvPr>
@@ -2946,7 +3233,7 @@
           <p:cNvPr id="5" name="Espace réservé du pied de page 4">
             <a:extLst>
               <a:ext uri="{FF2B5EF4-FFF2-40B4-BE49-F238E27FC236}">
-                <a16:creationId xmlns:a16="http://schemas.microsoft.com/office/drawing/2014/main" xmlns="" id="{8D57A1E5-E716-4EDD-A561-C6B60CDDFB0D}"/>
+                <a16:creationId xmlns:a16="http://schemas.microsoft.com/office/drawing/2014/main" id="{8D57A1E5-E716-4EDD-A561-C6B60CDDFB0D}"/>
               </a:ext>
             </a:extLst>
           </p:cNvPr>
@@ -2989,7 +3276,7 @@
           <p:cNvPr id="6" name="Espace réservé du numéro de diapositive 5">
             <a:extLst>
               <a:ext uri="{FF2B5EF4-FFF2-40B4-BE49-F238E27FC236}">
-                <a16:creationId xmlns:a16="http://schemas.microsoft.com/office/drawing/2014/main" xmlns="" id="{B1010E13-405A-42D9-8ED8-D89BAD3A5356}"/>
+                <a16:creationId xmlns:a16="http://schemas.microsoft.com/office/drawing/2014/main" id="{B1010E13-405A-42D9-8ED8-D89BAD3A5356}"/>
               </a:ext>
             </a:extLst>
           </p:cNvPr>
@@ -3035,7 +3322,7 @@
     </p:spTree>
     <p:extLst>
       <p:ext uri="{BB962C8B-B14F-4D97-AF65-F5344CB8AC3E}">
-        <p14:creationId xmlns:p14="http://schemas.microsoft.com/office/powerpoint/2010/main" xmlns="" val="2641030106"/>
+        <p14:creationId xmlns:p14="http://schemas.microsoft.com/office/powerpoint/2010/main" val="2641030106"/>
       </p:ext>
     </p:extLst>
   </p:cSld>
@@ -3358,7 +3645,7 @@
           <p:cNvPr id="57" name="Rectangle 56">
             <a:extLst>
               <a:ext uri="{FF2B5EF4-FFF2-40B4-BE49-F238E27FC236}">
-                <a16:creationId xmlns:a16="http://schemas.microsoft.com/office/drawing/2014/main" xmlns="" id="{80BE2BD4-9655-40E0-ADBD-D7DF5F94A22C}"/>
+                <a16:creationId xmlns:a16="http://schemas.microsoft.com/office/drawing/2014/main" id="{80BE2BD4-9655-40E0-ADBD-D7DF5F94A22C}"/>
               </a:ext>
             </a:extLst>
           </p:cNvPr>
@@ -3412,7 +3699,7 @@
           <p:cNvPr id="7" name="Image 6">
             <a:extLst>
               <a:ext uri="{FF2B5EF4-FFF2-40B4-BE49-F238E27FC236}">
-                <a16:creationId xmlns:a16="http://schemas.microsoft.com/office/drawing/2014/main" xmlns="" id="{7EA3BBB4-6372-4F91-A449-831237C5C455}"/>
+                <a16:creationId xmlns:a16="http://schemas.microsoft.com/office/drawing/2014/main" id="{7EA3BBB4-6372-4F91-A449-831237C5C455}"/>
               </a:ext>
             </a:extLst>
           </p:cNvPr>
@@ -3425,10 +3712,10 @@
           <a:blip r:embed="rId2" cstate="print">
             <a:extLst>
               <a:ext uri="{28A0092B-C50C-407E-A947-70E740481C1C}">
-                <a14:useLocalDpi xmlns:a14="http://schemas.microsoft.com/office/drawing/2010/main" xmlns="" val="0"/>
+                <a14:useLocalDpi xmlns:a14="http://schemas.microsoft.com/office/drawing/2010/main" val="0"/>
               </a:ext>
               <a:ext uri="{837473B0-CC2E-450A-ABE3-18F120FF3D39}">
-                <a1611:picAttrSrcUrl xmlns:a1611="http://schemas.microsoft.com/office/drawing/2016/11/main" xmlns="" r:id="rId3"/>
+                <a1611:picAttrSrcUrl xmlns:a1611="http://schemas.microsoft.com/office/drawing/2016/11/main" r:id="rId3"/>
               </a:ext>
             </a:extLst>
           </a:blip>
@@ -3438,7 +3725,7 @@
         </p:blipFill>
         <p:spPr>
           <a:xfrm>
-            <a:off x="586718" y="2911156"/>
+            <a:off x="569375" y="2653741"/>
             <a:ext cx="1704975" cy="1192151"/>
           </a:xfrm>
           <a:prstGeom prst="rect">
@@ -3451,7 +3738,7 @@
           <p:cNvPr id="9" name="ZoneTexte 8">
             <a:extLst>
               <a:ext uri="{FF2B5EF4-FFF2-40B4-BE49-F238E27FC236}">
-                <a16:creationId xmlns:a16="http://schemas.microsoft.com/office/drawing/2014/main" xmlns="" id="{25917D42-D84A-4334-BBC3-805E4F22AB4C}"/>
+                <a16:creationId xmlns:a16="http://schemas.microsoft.com/office/drawing/2014/main" id="{25917D42-D84A-4334-BBC3-805E4F22AB4C}"/>
               </a:ext>
             </a:extLst>
           </p:cNvPr>
@@ -3476,14 +3763,13 @@
           <a:p>
             <a:pPr algn="ctr"/>
             <a:r>
-              <a:rPr lang="fr-FR" b="1" u="sng" dirty="0" err="1" smtClean="0"/>
+              <a:rPr lang="fr-FR" b="1" u="sng" dirty="0" err="1"/>
               <a:t>Admin</a:t>
             </a:r>
             <a:r>
-              <a:rPr lang="fr-FR" b="1" u="sng" dirty="0" smtClean="0"/>
+              <a:rPr lang="fr-FR" b="1" u="sng" dirty="0"/>
               <a:t> : Gestion des utilisateurs</a:t>
             </a:r>
-            <a:endParaRPr lang="fr-FR" b="1" u="sng" dirty="0"/>
           </a:p>
         </p:txBody>
       </p:sp>
@@ -3492,7 +3778,7 @@
           <p:cNvPr id="11" name="ZoneTexte 10">
             <a:extLst>
               <a:ext uri="{FF2B5EF4-FFF2-40B4-BE49-F238E27FC236}">
-                <a16:creationId xmlns:a16="http://schemas.microsoft.com/office/drawing/2014/main" xmlns="" id="{82AB6933-3476-43A6-848A-40D65BD00D18}"/>
+                <a16:creationId xmlns:a16="http://schemas.microsoft.com/office/drawing/2014/main" id="{82AB6933-3476-43A6-848A-40D65BD00D18}"/>
               </a:ext>
             </a:extLst>
           </p:cNvPr>
@@ -3501,7 +3787,7 @@
         </p:nvSpPr>
         <p:spPr>
           <a:xfrm>
-            <a:off x="801977" y="4099114"/>
+            <a:off x="784634" y="3841699"/>
             <a:ext cx="1274456" cy="369332"/>
           </a:xfrm>
           <a:prstGeom prst="rect">
@@ -3517,7 +3803,7 @@
           <a:p>
             <a:pPr algn="ctr"/>
             <a:r>
-              <a:rPr lang="fr-FR" dirty="0" err="1" smtClean="0"/>
+              <a:rPr lang="fr-FR" dirty="0" err="1"/>
               <a:t>Admin</a:t>
             </a:r>
             <a:endParaRPr lang="fr-FR" dirty="0"/>
@@ -3529,7 +3815,7 @@
           <p:cNvPr id="12" name="Ellipse 11">
             <a:extLst>
               <a:ext uri="{FF2B5EF4-FFF2-40B4-BE49-F238E27FC236}">
-                <a16:creationId xmlns:a16="http://schemas.microsoft.com/office/drawing/2014/main" xmlns="" id="{A162F983-7EC5-49AA-BC55-8E730BD05A97}"/>
+                <a16:creationId xmlns:a16="http://schemas.microsoft.com/office/drawing/2014/main" id="{A162F983-7EC5-49AA-BC55-8E730BD05A97}"/>
               </a:ext>
             </a:extLst>
           </p:cNvPr>
@@ -3585,12 +3871,502 @@
           </a:p>
         </p:txBody>
       </p:sp>
-      <p:sp>
-        <p:nvSpPr>
-          <p:cNvPr id="33" name="Ellipse 32">
-            <a:extLst>
-              <a:ext uri="{FF2B5EF4-FFF2-40B4-BE49-F238E27FC236}">
-                <a16:creationId xmlns:a16="http://schemas.microsoft.com/office/drawing/2014/main" xmlns="" id="{6D38FFAD-5DE0-4B65-8D2E-174388C79FC3}"/>
+      <p:cxnSp>
+        <p:nvCxnSpPr>
+          <p:cNvPr id="35" name="Connecteur droit 34">
+            <a:extLst>
+              <a:ext uri="{FF2B5EF4-FFF2-40B4-BE49-F238E27FC236}">
+                <a16:creationId xmlns:a16="http://schemas.microsoft.com/office/drawing/2014/main" id="{182766B4-113A-4456-9F5C-D5373D99B750}"/>
+              </a:ext>
+            </a:extLst>
+          </p:cNvPr>
+          <p:cNvCxnSpPr>
+            <a:cxnSpLocks/>
+            <a:stCxn id="7" idx="3"/>
+            <a:endCxn id="21" idx="2"/>
+          </p:cNvCxnSpPr>
+          <p:nvPr/>
+        </p:nvCxnSpPr>
+        <p:spPr>
+          <a:xfrm>
+            <a:off x="2274350" y="3249817"/>
+            <a:ext cx="1819451" cy="387961"/>
+          </a:xfrm>
+          <a:prstGeom prst="line">
+            <a:avLst/>
+          </a:prstGeom>
+          <a:ln>
+            <a:solidFill>
+              <a:schemeClr val="tx1"/>
+            </a:solidFill>
+          </a:ln>
+        </p:spPr>
+        <p:style>
+          <a:lnRef idx="1">
+            <a:schemeClr val="accent1"/>
+          </a:lnRef>
+          <a:fillRef idx="0">
+            <a:schemeClr val="accent1"/>
+          </a:fillRef>
+          <a:effectRef idx="0">
+            <a:schemeClr val="accent1"/>
+          </a:effectRef>
+          <a:fontRef idx="minor">
+            <a:schemeClr val="tx1"/>
+          </a:fontRef>
+        </p:style>
+      </p:cxnSp>
+      <p:cxnSp>
+        <p:nvCxnSpPr>
+          <p:cNvPr id="36" name="Connecteur droit avec flèche 35">
+            <a:extLst>
+              <a:ext uri="{FF2B5EF4-FFF2-40B4-BE49-F238E27FC236}">
+                <a16:creationId xmlns:a16="http://schemas.microsoft.com/office/drawing/2014/main" id="{D186EB09-B5F6-4EE7-A72D-0599C9D2A89D}"/>
+              </a:ext>
+            </a:extLst>
+          </p:cNvPr>
+          <p:cNvCxnSpPr>
+            <a:cxnSpLocks/>
+            <a:stCxn id="21" idx="0"/>
+            <a:endCxn id="12" idx="2"/>
+          </p:cNvCxnSpPr>
+          <p:nvPr/>
+        </p:nvCxnSpPr>
+        <p:spPr>
+          <a:xfrm>
+            <a:off x="7732701" y="3637778"/>
+            <a:ext cx="1317861" cy="208114"/>
+          </a:xfrm>
+          <a:prstGeom prst="straightConnector1">
+            <a:avLst/>
+          </a:prstGeom>
+          <a:ln w="28575">
+            <a:solidFill>
+              <a:schemeClr val="tx1"/>
+            </a:solidFill>
+            <a:prstDash val="lgDash"/>
+            <a:tailEnd type="arrow" w="lg" len="lg"/>
+          </a:ln>
+        </p:spPr>
+        <p:style>
+          <a:lnRef idx="1">
+            <a:schemeClr val="accent1"/>
+          </a:lnRef>
+          <a:fillRef idx="0">
+            <a:schemeClr val="accent1"/>
+          </a:fillRef>
+          <a:effectRef idx="0">
+            <a:schemeClr val="accent1"/>
+          </a:effectRef>
+          <a:fontRef idx="minor">
+            <a:schemeClr val="tx1"/>
+          </a:fontRef>
+        </p:style>
+      </p:cxnSp>
+      <p:sp>
+        <p:nvSpPr>
+          <p:cNvPr id="37" name="ZoneTexte 36">
+            <a:extLst>
+              <a:ext uri="{FF2B5EF4-FFF2-40B4-BE49-F238E27FC236}">
+                <a16:creationId xmlns:a16="http://schemas.microsoft.com/office/drawing/2014/main" id="{3E175212-5FF3-434B-A914-908ABCB0D72B}"/>
+              </a:ext>
+            </a:extLst>
+          </p:cNvPr>
+          <p:cNvSpPr txBox="1"/>
+          <p:nvPr/>
+        </p:nvSpPr>
+        <p:spPr>
+          <a:xfrm>
+            <a:off x="7769993" y="3211680"/>
+            <a:ext cx="1450600" cy="369332"/>
+          </a:xfrm>
+          <a:prstGeom prst="rect">
+            <a:avLst/>
+          </a:prstGeom>
+          <a:noFill/>
+        </p:spPr>
+        <p:txBody>
+          <a:bodyPr wrap="square" rtlCol="0">
+            <a:spAutoFit/>
+          </a:bodyPr>
+          <a:lstStyle/>
+          <a:p>
+            <a:pPr algn="ctr"/>
+            <a:r>
+              <a:rPr lang="fr-FR" dirty="0"/>
+              <a:t>&lt;&lt;include&gt;&gt;</a:t>
+            </a:r>
+          </a:p>
+        </p:txBody>
+      </p:sp>
+      <p:grpSp>
+        <p:nvGrpSpPr>
+          <p:cNvPr id="19" name="Groupe 18">
+            <a:extLst>
+              <a:ext uri="{FF2B5EF4-FFF2-40B4-BE49-F238E27FC236}">
+                <a16:creationId xmlns:a16="http://schemas.microsoft.com/office/drawing/2014/main" id="{563865CC-9268-4A48-9488-B205E9D0268E}"/>
+              </a:ext>
+            </a:extLst>
+          </p:cNvPr>
+          <p:cNvGrpSpPr/>
+          <p:nvPr/>
+        </p:nvGrpSpPr>
+        <p:grpSpPr>
+          <a:xfrm>
+            <a:off x="4093801" y="2907395"/>
+            <a:ext cx="3638902" cy="1787037"/>
+            <a:chOff x="3905249" y="2674192"/>
+            <a:chExt cx="2963388" cy="1809039"/>
+          </a:xfrm>
+          <a:solidFill>
+            <a:schemeClr val="bg1"/>
+          </a:solidFill>
+        </p:grpSpPr>
+        <p:sp>
+          <p:nvSpPr>
+            <p:cNvPr id="20" name="Arc plein 29">
+              <a:extLst>
+                <a:ext uri="{FF2B5EF4-FFF2-40B4-BE49-F238E27FC236}">
+                  <a16:creationId xmlns:a16="http://schemas.microsoft.com/office/drawing/2014/main" id="{B8112496-D570-4564-812C-5162B26FBA8A}"/>
+                </a:ext>
+              </a:extLst>
+            </p:cNvPr>
+            <p:cNvSpPr/>
+            <p:nvPr/>
+          </p:nvSpPr>
+          <p:spPr>
+            <a:xfrm>
+              <a:off x="3905251" y="2674192"/>
+              <a:ext cx="2963386" cy="751978"/>
+            </a:xfrm>
+            <a:custGeom>
+              <a:avLst/>
+              <a:gdLst>
+                <a:gd name="connsiteX0" fmla="*/ 0 w 2963386"/>
+                <a:gd name="connsiteY0" fmla="*/ 904517 h 1809033"/>
+                <a:gd name="connsiteX1" fmla="*/ 1481693 w 2963386"/>
+                <a:gd name="connsiteY1" fmla="*/ 0 h 1809033"/>
+                <a:gd name="connsiteX2" fmla="*/ 2963386 w 2963386"/>
+                <a:gd name="connsiteY2" fmla="*/ 904517 h 1809033"/>
+                <a:gd name="connsiteX3" fmla="*/ 2511128 w 2963386"/>
+                <a:gd name="connsiteY3" fmla="*/ 904517 h 1809033"/>
+                <a:gd name="connsiteX4" fmla="*/ 1481693 w 2963386"/>
+                <a:gd name="connsiteY4" fmla="*/ 452259 h 1809033"/>
+                <a:gd name="connsiteX5" fmla="*/ 452258 w 2963386"/>
+                <a:gd name="connsiteY5" fmla="*/ 904517 h 1809033"/>
+                <a:gd name="connsiteX6" fmla="*/ 0 w 2963386"/>
+                <a:gd name="connsiteY6" fmla="*/ 904517 h 1809033"/>
+                <a:gd name="connsiteX0" fmla="*/ 0 w 2963386"/>
+                <a:gd name="connsiteY0" fmla="*/ 904517 h 904517"/>
+                <a:gd name="connsiteX1" fmla="*/ 1481693 w 2963386"/>
+                <a:gd name="connsiteY1" fmla="*/ 0 h 904517"/>
+                <a:gd name="connsiteX2" fmla="*/ 2963386 w 2963386"/>
+                <a:gd name="connsiteY2" fmla="*/ 904517 h 904517"/>
+                <a:gd name="connsiteX3" fmla="*/ 1481693 w 2963386"/>
+                <a:gd name="connsiteY3" fmla="*/ 452259 h 904517"/>
+                <a:gd name="connsiteX4" fmla="*/ 452258 w 2963386"/>
+                <a:gd name="connsiteY4" fmla="*/ 904517 h 904517"/>
+                <a:gd name="connsiteX5" fmla="*/ 0 w 2963386"/>
+                <a:gd name="connsiteY5" fmla="*/ 904517 h 904517"/>
+                <a:gd name="connsiteX0" fmla="*/ 0 w 2963386"/>
+                <a:gd name="connsiteY0" fmla="*/ 904517 h 904517"/>
+                <a:gd name="connsiteX1" fmla="*/ 1481693 w 2963386"/>
+                <a:gd name="connsiteY1" fmla="*/ 0 h 904517"/>
+                <a:gd name="connsiteX2" fmla="*/ 2963386 w 2963386"/>
+                <a:gd name="connsiteY2" fmla="*/ 904517 h 904517"/>
+                <a:gd name="connsiteX3" fmla="*/ 452258 w 2963386"/>
+                <a:gd name="connsiteY3" fmla="*/ 904517 h 904517"/>
+                <a:gd name="connsiteX4" fmla="*/ 0 w 2963386"/>
+                <a:gd name="connsiteY4" fmla="*/ 904517 h 904517"/>
+                <a:gd name="connsiteX0" fmla="*/ 0 w 2963386"/>
+                <a:gd name="connsiteY0" fmla="*/ 904517 h 904517"/>
+                <a:gd name="connsiteX1" fmla="*/ 1481693 w 2963386"/>
+                <a:gd name="connsiteY1" fmla="*/ 0 h 904517"/>
+                <a:gd name="connsiteX2" fmla="*/ 2963386 w 2963386"/>
+                <a:gd name="connsiteY2" fmla="*/ 904517 h 904517"/>
+                <a:gd name="connsiteX3" fmla="*/ 0 w 2963386"/>
+                <a:gd name="connsiteY3" fmla="*/ 904517 h 904517"/>
+              </a:gdLst>
+              <a:ahLst/>
+              <a:cxnLst>
+                <a:cxn ang="0">
+                  <a:pos x="connsiteX0" y="connsiteY0"/>
+                </a:cxn>
+                <a:cxn ang="0">
+                  <a:pos x="connsiteX1" y="connsiteY1"/>
+                </a:cxn>
+                <a:cxn ang="0">
+                  <a:pos x="connsiteX2" y="connsiteY2"/>
+                </a:cxn>
+                <a:cxn ang="0">
+                  <a:pos x="connsiteX3" y="connsiteY3"/>
+                </a:cxn>
+              </a:cxnLst>
+              <a:rect l="l" t="t" r="r" b="b"/>
+              <a:pathLst>
+                <a:path w="2963386" h="904517">
+                  <a:moveTo>
+                    <a:pt x="0" y="904517"/>
+                  </a:moveTo>
+                  <a:cubicBezTo>
+                    <a:pt x="0" y="404966"/>
+                    <a:pt x="663377" y="0"/>
+                    <a:pt x="1481693" y="0"/>
+                  </a:cubicBezTo>
+                  <a:cubicBezTo>
+                    <a:pt x="2300009" y="0"/>
+                    <a:pt x="2963386" y="404966"/>
+                    <a:pt x="2963386" y="904517"/>
+                  </a:cubicBezTo>
+                  <a:lnTo>
+                    <a:pt x="0" y="904517"/>
+                  </a:lnTo>
+                  <a:close/>
+                </a:path>
+              </a:pathLst>
+            </a:custGeom>
+            <a:grpFill/>
+            <a:ln w="19050">
+              <a:solidFill>
+                <a:schemeClr val="tx1"/>
+              </a:solidFill>
+            </a:ln>
+          </p:spPr>
+          <p:style>
+            <a:lnRef idx="2">
+              <a:schemeClr val="accent1">
+                <a:shade val="50000"/>
+              </a:schemeClr>
+            </a:lnRef>
+            <a:fillRef idx="1">
+              <a:schemeClr val="accent1"/>
+            </a:fillRef>
+            <a:effectRef idx="0">
+              <a:schemeClr val="accent1"/>
+            </a:effectRef>
+            <a:fontRef idx="minor">
+              <a:schemeClr val="lt1"/>
+            </a:fontRef>
+          </p:style>
+          <p:txBody>
+            <a:bodyPr rtlCol="0" anchor="ctr"/>
+            <a:lstStyle/>
+            <a:p>
+              <a:pPr algn="ctr"/>
+              <a:r>
+                <a:rPr lang="fr-FR" dirty="0">
+                  <a:solidFill>
+                    <a:schemeClr val="tx1"/>
+                  </a:solidFill>
+                </a:rPr>
+                <a:t>Gérer les utilisateurs</a:t>
+              </a:r>
+            </a:p>
+          </p:txBody>
+        </p:sp>
+        <p:sp>
+          <p:nvSpPr>
+            <p:cNvPr id="21" name="Arc plein 29">
+              <a:extLst>
+                <a:ext uri="{FF2B5EF4-FFF2-40B4-BE49-F238E27FC236}">
+                  <a16:creationId xmlns:a16="http://schemas.microsoft.com/office/drawing/2014/main" id="{C761AF7C-91AA-4DC4-A947-F9CCFA88603B}"/>
+                </a:ext>
+              </a:extLst>
+            </p:cNvPr>
+            <p:cNvSpPr/>
+            <p:nvPr/>
+          </p:nvSpPr>
+          <p:spPr>
+            <a:xfrm rot="10800000">
+              <a:off x="3905249" y="3413567"/>
+              <a:ext cx="2963386" cy="1069664"/>
+            </a:xfrm>
+            <a:custGeom>
+              <a:avLst/>
+              <a:gdLst>
+                <a:gd name="connsiteX0" fmla="*/ 0 w 2963386"/>
+                <a:gd name="connsiteY0" fmla="*/ 904517 h 1809033"/>
+                <a:gd name="connsiteX1" fmla="*/ 1481693 w 2963386"/>
+                <a:gd name="connsiteY1" fmla="*/ 0 h 1809033"/>
+                <a:gd name="connsiteX2" fmla="*/ 2963386 w 2963386"/>
+                <a:gd name="connsiteY2" fmla="*/ 904517 h 1809033"/>
+                <a:gd name="connsiteX3" fmla="*/ 2511128 w 2963386"/>
+                <a:gd name="connsiteY3" fmla="*/ 904517 h 1809033"/>
+                <a:gd name="connsiteX4" fmla="*/ 1481693 w 2963386"/>
+                <a:gd name="connsiteY4" fmla="*/ 452259 h 1809033"/>
+                <a:gd name="connsiteX5" fmla="*/ 452258 w 2963386"/>
+                <a:gd name="connsiteY5" fmla="*/ 904517 h 1809033"/>
+                <a:gd name="connsiteX6" fmla="*/ 0 w 2963386"/>
+                <a:gd name="connsiteY6" fmla="*/ 904517 h 1809033"/>
+                <a:gd name="connsiteX0" fmla="*/ 0 w 2963386"/>
+                <a:gd name="connsiteY0" fmla="*/ 904517 h 904517"/>
+                <a:gd name="connsiteX1" fmla="*/ 1481693 w 2963386"/>
+                <a:gd name="connsiteY1" fmla="*/ 0 h 904517"/>
+                <a:gd name="connsiteX2" fmla="*/ 2963386 w 2963386"/>
+                <a:gd name="connsiteY2" fmla="*/ 904517 h 904517"/>
+                <a:gd name="connsiteX3" fmla="*/ 1481693 w 2963386"/>
+                <a:gd name="connsiteY3" fmla="*/ 452259 h 904517"/>
+                <a:gd name="connsiteX4" fmla="*/ 452258 w 2963386"/>
+                <a:gd name="connsiteY4" fmla="*/ 904517 h 904517"/>
+                <a:gd name="connsiteX5" fmla="*/ 0 w 2963386"/>
+                <a:gd name="connsiteY5" fmla="*/ 904517 h 904517"/>
+                <a:gd name="connsiteX0" fmla="*/ 0 w 2963386"/>
+                <a:gd name="connsiteY0" fmla="*/ 904517 h 904517"/>
+                <a:gd name="connsiteX1" fmla="*/ 1481693 w 2963386"/>
+                <a:gd name="connsiteY1" fmla="*/ 0 h 904517"/>
+                <a:gd name="connsiteX2" fmla="*/ 2963386 w 2963386"/>
+                <a:gd name="connsiteY2" fmla="*/ 904517 h 904517"/>
+                <a:gd name="connsiteX3" fmla="*/ 452258 w 2963386"/>
+                <a:gd name="connsiteY3" fmla="*/ 904517 h 904517"/>
+                <a:gd name="connsiteX4" fmla="*/ 0 w 2963386"/>
+                <a:gd name="connsiteY4" fmla="*/ 904517 h 904517"/>
+                <a:gd name="connsiteX0" fmla="*/ 0 w 2963386"/>
+                <a:gd name="connsiteY0" fmla="*/ 904517 h 904517"/>
+                <a:gd name="connsiteX1" fmla="*/ 1481693 w 2963386"/>
+                <a:gd name="connsiteY1" fmla="*/ 0 h 904517"/>
+                <a:gd name="connsiteX2" fmla="*/ 2963386 w 2963386"/>
+                <a:gd name="connsiteY2" fmla="*/ 904517 h 904517"/>
+                <a:gd name="connsiteX3" fmla="*/ 0 w 2963386"/>
+                <a:gd name="connsiteY3" fmla="*/ 904517 h 904517"/>
+              </a:gdLst>
+              <a:ahLst/>
+              <a:cxnLst>
+                <a:cxn ang="0">
+                  <a:pos x="connsiteX0" y="connsiteY0"/>
+                </a:cxn>
+                <a:cxn ang="0">
+                  <a:pos x="connsiteX1" y="connsiteY1"/>
+                </a:cxn>
+                <a:cxn ang="0">
+                  <a:pos x="connsiteX2" y="connsiteY2"/>
+                </a:cxn>
+                <a:cxn ang="0">
+                  <a:pos x="connsiteX3" y="connsiteY3"/>
+                </a:cxn>
+              </a:cxnLst>
+              <a:rect l="l" t="t" r="r" b="b"/>
+              <a:pathLst>
+                <a:path w="2963386" h="904517">
+                  <a:moveTo>
+                    <a:pt x="0" y="904517"/>
+                  </a:moveTo>
+                  <a:cubicBezTo>
+                    <a:pt x="0" y="404966"/>
+                    <a:pt x="663377" y="0"/>
+                    <a:pt x="1481693" y="0"/>
+                  </a:cubicBezTo>
+                  <a:cubicBezTo>
+                    <a:pt x="2300009" y="0"/>
+                    <a:pt x="2963386" y="404966"/>
+                    <a:pt x="2963386" y="904517"/>
+                  </a:cubicBezTo>
+                  <a:lnTo>
+                    <a:pt x="0" y="904517"/>
+                  </a:lnTo>
+                  <a:close/>
+                </a:path>
+              </a:pathLst>
+            </a:custGeom>
+            <a:grpFill/>
+            <a:ln w="19050">
+              <a:solidFill>
+                <a:schemeClr val="tx1"/>
+              </a:solidFill>
+            </a:ln>
+          </p:spPr>
+          <p:style>
+            <a:lnRef idx="2">
+              <a:schemeClr val="accent1">
+                <a:shade val="50000"/>
+              </a:schemeClr>
+            </a:lnRef>
+            <a:fillRef idx="1">
+              <a:schemeClr val="accent1"/>
+            </a:fillRef>
+            <a:effectRef idx="0">
+              <a:schemeClr val="accent1"/>
+            </a:effectRef>
+            <a:fontRef idx="minor">
+              <a:schemeClr val="lt1"/>
+            </a:fontRef>
+          </p:style>
+          <p:txBody>
+            <a:bodyPr vert="horz" rtlCol="0" anchor="b">
+              <a:scene3d>
+                <a:camera prst="orthographicFront">
+                  <a:rot lat="0" lon="0" rev="10800000"/>
+                </a:camera>
+                <a:lightRig rig="threePt" dir="t"/>
+              </a:scene3d>
+            </a:bodyPr>
+            <a:lstStyle/>
+            <a:p>
+              <a:pPr algn="ctr"/>
+              <a:r>
+                <a:rPr lang="fr-FR" dirty="0">
+                  <a:solidFill>
+                    <a:schemeClr val="tx1"/>
+                  </a:solidFill>
+                </a:rPr>
+                <a:t>Extension point -&gt; affectation ligue</a:t>
+              </a:r>
+            </a:p>
+            <a:p>
+              <a:pPr algn="ctr"/>
+              <a:r>
+                <a:rPr lang="fr-FR" dirty="0">
+                  <a:solidFill>
+                    <a:schemeClr val="tx1"/>
+                  </a:solidFill>
+                </a:rPr>
+                <a:t>Extension point -&gt; affectation salle</a:t>
+              </a:r>
+            </a:p>
+          </p:txBody>
+        </p:sp>
+      </p:grpSp>
+      <p:sp>
+        <p:nvSpPr>
+          <p:cNvPr id="25" name="ZoneTexte 24">
+            <a:extLst>
+              <a:ext uri="{FF2B5EF4-FFF2-40B4-BE49-F238E27FC236}">
+                <a16:creationId xmlns:a16="http://schemas.microsoft.com/office/drawing/2014/main" id="{14DF6337-FCDC-4CF2-9872-85B93072B55F}"/>
+              </a:ext>
+            </a:extLst>
+          </p:cNvPr>
+          <p:cNvSpPr txBox="1"/>
+          <p:nvPr/>
+        </p:nvSpPr>
+        <p:spPr>
+          <a:xfrm>
+            <a:off x="4225478" y="4694433"/>
+            <a:ext cx="1450600" cy="369332"/>
+          </a:xfrm>
+          <a:prstGeom prst="rect">
+            <a:avLst/>
+          </a:prstGeom>
+          <a:noFill/>
+        </p:spPr>
+        <p:txBody>
+          <a:bodyPr wrap="square" rtlCol="0">
+            <a:spAutoFit/>
+          </a:bodyPr>
+          <a:lstStyle/>
+          <a:p>
+            <a:pPr algn="ctr"/>
+            <a:r>
+              <a:rPr lang="fr-FR" dirty="0"/>
+              <a:t>&lt;&lt;extend&gt;&gt;</a:t>
+            </a:r>
+          </a:p>
+        </p:txBody>
+      </p:sp>
+      <p:sp>
+        <p:nvSpPr>
+          <p:cNvPr id="26" name="Ellipse 25">
+            <a:extLst>
+              <a:ext uri="{FF2B5EF4-FFF2-40B4-BE49-F238E27FC236}">
+                <a16:creationId xmlns:a16="http://schemas.microsoft.com/office/drawing/2014/main" id="{E41484C4-BD4B-453D-BD08-A4EC6E85FE4F}"/>
               </a:ext>
             </a:extLst>
           </p:cNvPr>
@@ -3599,8 +4375,8 @@
         </p:nvSpPr>
         <p:spPr>
           <a:xfrm>
-            <a:off x="4439370" y="3403545"/>
-            <a:ext cx="2295149" cy="833783"/>
+            <a:off x="4486784" y="5401439"/>
+            <a:ext cx="1734269" cy="752518"/>
           </a:xfrm>
           <a:prstGeom prst="ellipse">
             <a:avLst/>
@@ -3636,22 +4412,68 @@
           <a:p>
             <a:pPr algn="ctr"/>
             <a:r>
-              <a:rPr lang="fr-FR" dirty="0" smtClean="0">
+              <a:rPr lang="fr-FR" dirty="0">
                 <a:solidFill>
                   <a:schemeClr val="tx1"/>
                 </a:solidFill>
               </a:rPr>
-              <a:t>Modifier un utilisateur</a:t>
-            </a:r>
-          </a:p>
-        </p:txBody>
-      </p:sp>
-      <p:sp>
-        <p:nvSpPr>
-          <p:cNvPr id="13" name="Ellipse 12">
-            <a:extLst>
-              <a:ext uri="{FF2B5EF4-FFF2-40B4-BE49-F238E27FC236}">
-                <a16:creationId xmlns:a16="http://schemas.microsoft.com/office/drawing/2014/main" xmlns="" id="{C34807EB-0774-443D-B5C9-C7C8424BC2CB}"/>
+              <a:t>Affecter une ligue</a:t>
+            </a:r>
+          </a:p>
+        </p:txBody>
+      </p:sp>
+      <p:cxnSp>
+        <p:nvCxnSpPr>
+          <p:cNvPr id="27" name="Connecteur droit avec flèche 26">
+            <a:extLst>
+              <a:ext uri="{FF2B5EF4-FFF2-40B4-BE49-F238E27FC236}">
+                <a16:creationId xmlns:a16="http://schemas.microsoft.com/office/drawing/2014/main" id="{2BA00DB8-06D8-4B6B-BCD3-2392483EC006}"/>
+              </a:ext>
+            </a:extLst>
+          </p:cNvPr>
+          <p:cNvCxnSpPr>
+            <a:cxnSpLocks/>
+            <a:stCxn id="26" idx="0"/>
+          </p:cNvCxnSpPr>
+          <p:nvPr/>
+        </p:nvCxnSpPr>
+        <p:spPr>
+          <a:xfrm flipV="1">
+            <a:off x="5353919" y="4694432"/>
+            <a:ext cx="559334" cy="707007"/>
+          </a:xfrm>
+          <a:prstGeom prst="straightConnector1">
+            <a:avLst/>
+          </a:prstGeom>
+          <a:ln w="28575">
+            <a:solidFill>
+              <a:schemeClr val="tx1"/>
+            </a:solidFill>
+            <a:prstDash val="lgDash"/>
+            <a:tailEnd type="arrow" w="lg" len="lg"/>
+          </a:ln>
+        </p:spPr>
+        <p:style>
+          <a:lnRef idx="1">
+            <a:schemeClr val="accent1"/>
+          </a:lnRef>
+          <a:fillRef idx="0">
+            <a:schemeClr val="accent1"/>
+          </a:fillRef>
+          <a:effectRef idx="0">
+            <a:schemeClr val="accent1"/>
+          </a:effectRef>
+          <a:fontRef idx="minor">
+            <a:schemeClr val="tx1"/>
+          </a:fontRef>
+        </p:style>
+      </p:cxnSp>
+      <p:sp>
+        <p:nvSpPr>
+          <p:cNvPr id="28" name="Rectangle : carré corné 27">
+            <a:extLst>
+              <a:ext uri="{FF2B5EF4-FFF2-40B4-BE49-F238E27FC236}">
+                <a16:creationId xmlns:a16="http://schemas.microsoft.com/office/drawing/2014/main" id="{C32BC31E-5EF0-47B6-89D7-FACC151A1656}"/>
               </a:ext>
             </a:extLst>
           </p:cNvPr>
@@ -3660,8 +4482,150 @@
         </p:nvSpPr>
         <p:spPr>
           <a:xfrm>
-            <a:off x="4461182" y="1648461"/>
-            <a:ext cx="2295149" cy="833783"/>
+            <a:off x="6968628" y="5477544"/>
+            <a:ext cx="2029547" cy="660091"/>
+          </a:xfrm>
+          <a:prstGeom prst="foldedCorner">
+            <a:avLst/>
+          </a:prstGeom>
+          <a:solidFill>
+            <a:schemeClr val="bg1"/>
+          </a:solidFill>
+          <a:ln w="19050" cap="sq">
+            <a:solidFill>
+              <a:schemeClr val="tx1"/>
+            </a:solidFill>
+          </a:ln>
+        </p:spPr>
+        <p:style>
+          <a:lnRef idx="2">
+            <a:schemeClr val="accent1">
+              <a:shade val="50000"/>
+            </a:schemeClr>
+          </a:lnRef>
+          <a:fillRef idx="1">
+            <a:schemeClr val="accent1"/>
+          </a:fillRef>
+          <a:effectRef idx="0">
+            <a:schemeClr val="accent1"/>
+          </a:effectRef>
+          <a:fontRef idx="minor">
+            <a:schemeClr val="lt1"/>
+          </a:fontRef>
+        </p:style>
+        <p:txBody>
+          <a:bodyPr rtlCol="0" anchor="t"/>
+          <a:lstStyle/>
+          <a:p>
+            <a:pPr algn="ctr"/>
+            <a:r>
+              <a:rPr lang="fr-FR" dirty="0">
+                <a:solidFill>
+                  <a:schemeClr val="tx1"/>
+                </a:solidFill>
+              </a:rPr>
+              <a:t>Condition : Ligue déjà existante</a:t>
+            </a:r>
+          </a:p>
+        </p:txBody>
+      </p:sp>
+      <p:cxnSp>
+        <p:nvCxnSpPr>
+          <p:cNvPr id="29" name="Connecteur droit 28">
+            <a:extLst>
+              <a:ext uri="{FF2B5EF4-FFF2-40B4-BE49-F238E27FC236}">
+                <a16:creationId xmlns:a16="http://schemas.microsoft.com/office/drawing/2014/main" id="{38C74184-18EA-4FB9-9646-1BE332DE96D1}"/>
+              </a:ext>
+            </a:extLst>
+          </p:cNvPr>
+          <p:cNvCxnSpPr>
+            <a:cxnSpLocks/>
+            <a:stCxn id="28" idx="1"/>
+          </p:cNvCxnSpPr>
+          <p:nvPr/>
+        </p:nvCxnSpPr>
+        <p:spPr>
+          <a:xfrm flipH="1" flipV="1">
+            <a:off x="5717194" y="4879099"/>
+            <a:ext cx="1251434" cy="928491"/>
+          </a:xfrm>
+          <a:prstGeom prst="line">
+            <a:avLst/>
+          </a:prstGeom>
+          <a:ln w="25400">
+            <a:solidFill>
+              <a:schemeClr val="tx1"/>
+            </a:solidFill>
+            <a:prstDash val="lgDash"/>
+          </a:ln>
+        </p:spPr>
+        <p:style>
+          <a:lnRef idx="1">
+            <a:schemeClr val="accent1"/>
+          </a:lnRef>
+          <a:fillRef idx="0">
+            <a:schemeClr val="accent1"/>
+          </a:fillRef>
+          <a:effectRef idx="0">
+            <a:schemeClr val="accent1"/>
+          </a:effectRef>
+          <a:fontRef idx="minor">
+            <a:schemeClr val="tx1"/>
+          </a:fontRef>
+        </p:style>
+      </p:cxnSp>
+      <p:sp>
+        <p:nvSpPr>
+          <p:cNvPr id="32" name="ZoneTexte 31">
+            <a:extLst>
+              <a:ext uri="{FF2B5EF4-FFF2-40B4-BE49-F238E27FC236}">
+                <a16:creationId xmlns:a16="http://schemas.microsoft.com/office/drawing/2014/main" id="{5EE05DFB-6656-4BBB-97BD-596407B61579}"/>
+              </a:ext>
+            </a:extLst>
+          </p:cNvPr>
+          <p:cNvSpPr txBox="1"/>
+          <p:nvPr/>
+        </p:nvSpPr>
+        <p:spPr>
+          <a:xfrm>
+            <a:off x="3915057" y="2351482"/>
+            <a:ext cx="1450600" cy="369332"/>
+          </a:xfrm>
+          <a:prstGeom prst="rect">
+            <a:avLst/>
+          </a:prstGeom>
+          <a:noFill/>
+        </p:spPr>
+        <p:txBody>
+          <a:bodyPr wrap="square" rtlCol="0">
+            <a:spAutoFit/>
+          </a:bodyPr>
+          <a:lstStyle/>
+          <a:p>
+            <a:pPr algn="ctr"/>
+            <a:r>
+              <a:rPr lang="fr-FR" dirty="0"/>
+              <a:t>&lt;&lt;extend&gt;&gt;</a:t>
+            </a:r>
+          </a:p>
+        </p:txBody>
+      </p:sp>
+      <p:sp>
+        <p:nvSpPr>
+          <p:cNvPr id="34" name="Ellipse 33">
+            <a:extLst>
+              <a:ext uri="{FF2B5EF4-FFF2-40B4-BE49-F238E27FC236}">
+                <a16:creationId xmlns:a16="http://schemas.microsoft.com/office/drawing/2014/main" id="{5B809223-CE93-48DF-AC11-EF1E3C1901C5}"/>
+              </a:ext>
+            </a:extLst>
+          </p:cNvPr>
+          <p:cNvSpPr/>
+          <p:nvPr/>
+        </p:nvSpPr>
+        <p:spPr>
+          <a:xfrm>
+            <a:off x="4225478" y="1465234"/>
+            <a:ext cx="1734269" cy="752518"/>
           </a:xfrm>
           <a:prstGeom prst="ellipse">
             <a:avLst/>
@@ -3697,86 +4661,36 @@
           <a:p>
             <a:pPr algn="ctr"/>
             <a:r>
-              <a:rPr lang="fr-FR" dirty="0" smtClean="0">
+              <a:rPr lang="fr-FR" dirty="0">
                 <a:solidFill>
                   <a:schemeClr val="tx1"/>
                 </a:solidFill>
               </a:rPr>
-              <a:t>Ajouter un utilisateur</a:t>
-            </a:r>
-            <a:endParaRPr lang="fr-FR" dirty="0">
-              <a:solidFill>
-                <a:schemeClr val="tx1"/>
-              </a:solidFill>
-            </a:endParaRPr>
+              <a:t>Affecter une salle</a:t>
+            </a:r>
           </a:p>
         </p:txBody>
       </p:sp>
       <p:cxnSp>
         <p:nvCxnSpPr>
-          <p:cNvPr id="4" name="Connecteur droit 3">
-            <a:extLst>
-              <a:ext uri="{FF2B5EF4-FFF2-40B4-BE49-F238E27FC236}">
-                <a16:creationId xmlns:a16="http://schemas.microsoft.com/office/drawing/2014/main" xmlns="" id="{94EE7817-952C-46F9-AEA1-B12C445AA075}"/>
+          <p:cNvPr id="39" name="Connecteur droit avec flèche 38">
+            <a:extLst>
+              <a:ext uri="{FF2B5EF4-FFF2-40B4-BE49-F238E27FC236}">
+                <a16:creationId xmlns:a16="http://schemas.microsoft.com/office/drawing/2014/main" id="{B3594B2E-6D0B-447D-975A-54D31C66E7CA}"/>
               </a:ext>
             </a:extLst>
           </p:cNvPr>
           <p:cNvCxnSpPr>
             <a:cxnSpLocks/>
-            <a:stCxn id="7" idx="3"/>
-            <a:endCxn id="13" idx="2"/>
+            <a:stCxn id="34" idx="4"/>
+            <a:endCxn id="20" idx="1"/>
           </p:cNvCxnSpPr>
           <p:nvPr/>
         </p:nvCxnSpPr>
         <p:spPr>
-          <a:xfrm flipV="1">
-            <a:off x="2291693" y="2065353"/>
-            <a:ext cx="2169489" cy="1441879"/>
-          </a:xfrm>
-          <a:prstGeom prst="line">
-            <a:avLst/>
-          </a:prstGeom>
-          <a:ln>
-            <a:solidFill>
-              <a:schemeClr val="tx1"/>
-            </a:solidFill>
-          </a:ln>
-        </p:spPr>
-        <p:style>
-          <a:lnRef idx="1">
-            <a:schemeClr val="accent1"/>
-          </a:lnRef>
-          <a:fillRef idx="0">
-            <a:schemeClr val="accent1"/>
-          </a:fillRef>
-          <a:effectRef idx="0">
-            <a:schemeClr val="accent1"/>
-          </a:effectRef>
-          <a:fontRef idx="minor">
-            <a:schemeClr val="tx1"/>
-          </a:fontRef>
-        </p:style>
-      </p:cxnSp>
-      <p:cxnSp>
-        <p:nvCxnSpPr>
-          <p:cNvPr id="23" name="Connecteur droit avec flèche 22">
-            <a:extLst>
-              <a:ext uri="{FF2B5EF4-FFF2-40B4-BE49-F238E27FC236}">
-                <a16:creationId xmlns:a16="http://schemas.microsoft.com/office/drawing/2014/main" xmlns="" id="{D4187190-3D83-40A7-A51B-78582ED94F37}"/>
-              </a:ext>
-            </a:extLst>
-          </p:cNvPr>
-          <p:cNvCxnSpPr>
-            <a:cxnSpLocks/>
-            <a:stCxn id="13" idx="6"/>
-            <a:endCxn id="12" idx="1"/>
-          </p:cNvCxnSpPr>
-          <p:nvPr/>
-        </p:nvCxnSpPr>
-        <p:spPr>
-          <a:xfrm>
-            <a:off x="6756331" y="2065353"/>
-            <a:ext cx="2691942" cy="1485752"/>
+          <a:xfrm>
+            <a:off x="5092613" y="2217752"/>
+            <a:ext cx="820640" cy="689643"/>
           </a:xfrm>
           <a:prstGeom prst="straightConnector1">
             <a:avLst/>
@@ -3806,174 +4720,10 @@
       </p:cxnSp>
       <p:sp>
         <p:nvSpPr>
-          <p:cNvPr id="24" name="ZoneTexte 23">
-            <a:extLst>
-              <a:ext uri="{FF2B5EF4-FFF2-40B4-BE49-F238E27FC236}">
-                <a16:creationId xmlns:a16="http://schemas.microsoft.com/office/drawing/2014/main" xmlns="" id="{C80D4B28-9F40-48AD-A21B-63B73871B3B9}"/>
-              </a:ext>
-            </a:extLst>
-          </p:cNvPr>
-          <p:cNvSpPr txBox="1"/>
-          <p:nvPr/>
-        </p:nvSpPr>
-        <p:spPr>
-          <a:xfrm>
-            <a:off x="8254129" y="2344290"/>
-            <a:ext cx="1450600" cy="369332"/>
-          </a:xfrm>
-          <a:prstGeom prst="rect">
-            <a:avLst/>
-          </a:prstGeom>
-          <a:noFill/>
-        </p:spPr>
-        <p:txBody>
-          <a:bodyPr wrap="square" rtlCol="0">
-            <a:spAutoFit/>
-          </a:bodyPr>
-          <a:lstStyle/>
-          <a:p>
-            <a:pPr algn="ctr"/>
-            <a:r>
-              <a:rPr lang="fr-FR" dirty="0"/>
-              <a:t>&lt;&lt;include&gt;&gt;</a:t>
-            </a:r>
-          </a:p>
-        </p:txBody>
-      </p:sp>
-      <p:cxnSp>
-        <p:nvCxnSpPr>
-          <p:cNvPr id="35" name="Connecteur droit 34">
-            <a:extLst>
-              <a:ext uri="{FF2B5EF4-FFF2-40B4-BE49-F238E27FC236}">
-                <a16:creationId xmlns:a16="http://schemas.microsoft.com/office/drawing/2014/main" xmlns="" id="{182766B4-113A-4456-9F5C-D5373D99B750}"/>
-              </a:ext>
-            </a:extLst>
-          </p:cNvPr>
-          <p:cNvCxnSpPr>
-            <a:cxnSpLocks/>
-            <a:stCxn id="7" idx="3"/>
-            <a:endCxn id="33" idx="2"/>
-          </p:cNvCxnSpPr>
-          <p:nvPr/>
-        </p:nvCxnSpPr>
-        <p:spPr>
-          <a:xfrm>
-            <a:off x="2291693" y="3507232"/>
-            <a:ext cx="2147677" cy="313205"/>
-          </a:xfrm>
-          <a:prstGeom prst="line">
-            <a:avLst/>
-          </a:prstGeom>
-          <a:ln>
-            <a:solidFill>
-              <a:schemeClr val="tx1"/>
-            </a:solidFill>
-          </a:ln>
-        </p:spPr>
-        <p:style>
-          <a:lnRef idx="1">
-            <a:schemeClr val="accent1"/>
-          </a:lnRef>
-          <a:fillRef idx="0">
-            <a:schemeClr val="accent1"/>
-          </a:fillRef>
-          <a:effectRef idx="0">
-            <a:schemeClr val="accent1"/>
-          </a:effectRef>
-          <a:fontRef idx="minor">
-            <a:schemeClr val="tx1"/>
-          </a:fontRef>
-        </p:style>
-      </p:cxnSp>
-      <p:cxnSp>
-        <p:nvCxnSpPr>
-          <p:cNvPr id="36" name="Connecteur droit avec flèche 35">
-            <a:extLst>
-              <a:ext uri="{FF2B5EF4-FFF2-40B4-BE49-F238E27FC236}">
-                <a16:creationId xmlns:a16="http://schemas.microsoft.com/office/drawing/2014/main" xmlns="" id="{D186EB09-B5F6-4EE7-A72D-0599C9D2A89D}"/>
-              </a:ext>
-            </a:extLst>
-          </p:cNvPr>
-          <p:cNvCxnSpPr>
-            <a:cxnSpLocks/>
-            <a:stCxn id="33" idx="6"/>
-            <a:endCxn id="12" idx="2"/>
-          </p:cNvCxnSpPr>
-          <p:nvPr/>
-        </p:nvCxnSpPr>
-        <p:spPr>
-          <a:xfrm>
-            <a:off x="6734519" y="3820437"/>
-            <a:ext cx="2316043" cy="25455"/>
-          </a:xfrm>
-          <a:prstGeom prst="straightConnector1">
-            <a:avLst/>
-          </a:prstGeom>
-          <a:ln w="28575">
-            <a:solidFill>
-              <a:schemeClr val="tx1"/>
-            </a:solidFill>
-            <a:prstDash val="lgDash"/>
-            <a:tailEnd type="arrow" w="lg" len="lg"/>
-          </a:ln>
-        </p:spPr>
-        <p:style>
-          <a:lnRef idx="1">
-            <a:schemeClr val="accent1"/>
-          </a:lnRef>
-          <a:fillRef idx="0">
-            <a:schemeClr val="accent1"/>
-          </a:fillRef>
-          <a:effectRef idx="0">
-            <a:schemeClr val="accent1"/>
-          </a:effectRef>
-          <a:fontRef idx="minor">
-            <a:schemeClr val="tx1"/>
-          </a:fontRef>
-        </p:style>
-      </p:cxnSp>
-      <p:sp>
-        <p:nvSpPr>
-          <p:cNvPr id="37" name="ZoneTexte 36">
-            <a:extLst>
-              <a:ext uri="{FF2B5EF4-FFF2-40B4-BE49-F238E27FC236}">
-                <a16:creationId xmlns:a16="http://schemas.microsoft.com/office/drawing/2014/main" xmlns="" id="{3E175212-5FF3-434B-A914-908ABCB0D72B}"/>
-              </a:ext>
-            </a:extLst>
-          </p:cNvPr>
-          <p:cNvSpPr txBox="1"/>
-          <p:nvPr/>
-        </p:nvSpPr>
-        <p:spPr>
-          <a:xfrm>
-            <a:off x="6947063" y="3938038"/>
-            <a:ext cx="1450600" cy="369332"/>
-          </a:xfrm>
-          <a:prstGeom prst="rect">
-            <a:avLst/>
-          </a:prstGeom>
-          <a:noFill/>
-        </p:spPr>
-        <p:txBody>
-          <a:bodyPr wrap="square" rtlCol="0">
-            <a:spAutoFit/>
-          </a:bodyPr>
-          <a:lstStyle/>
-          <a:p>
-            <a:pPr algn="ctr"/>
-            <a:r>
-              <a:rPr lang="fr-FR" dirty="0"/>
-              <a:t>&lt;&lt;include&gt;&gt;</a:t>
-            </a:r>
-          </a:p>
-        </p:txBody>
-      </p:sp>
-      <p:sp>
-        <p:nvSpPr>
-          <p:cNvPr id="30" name="Ellipse 29">
-            <a:extLst>
-              <a:ext uri="{FF2B5EF4-FFF2-40B4-BE49-F238E27FC236}">
-                <a16:creationId xmlns:a16="http://schemas.microsoft.com/office/drawing/2014/main" xmlns="" id="{C34807EB-0774-443D-B5C9-C7C8424BC2CB}"/>
+          <p:cNvPr id="41" name="Rectangle : carré corné 40">
+            <a:extLst>
+              <a:ext uri="{FF2B5EF4-FFF2-40B4-BE49-F238E27FC236}">
+                <a16:creationId xmlns:a16="http://schemas.microsoft.com/office/drawing/2014/main" id="{9043F4C9-BA42-4387-A6F0-69CCC42341E3}"/>
               </a:ext>
             </a:extLst>
           </p:cNvPr>
@@ -3982,10 +4732,10 @@
         </p:nvSpPr>
         <p:spPr>
           <a:xfrm>
-            <a:off x="4527613" y="4825415"/>
-            <a:ext cx="2295149" cy="833783"/>
-          </a:xfrm>
-          <a:prstGeom prst="ellipse">
+            <a:off x="6707322" y="1541339"/>
+            <a:ext cx="2029547" cy="660091"/>
+          </a:xfrm>
+          <a:prstGeom prst="foldedCorner">
             <a:avLst/>
           </a:prstGeom>
           <a:solidFill>
@@ -4014,52 +4764,49 @@
           </a:fontRef>
         </p:style>
         <p:txBody>
-          <a:bodyPr rtlCol="0" anchor="ctr"/>
+          <a:bodyPr rtlCol="0" anchor="t"/>
           <a:lstStyle/>
           <a:p>
             <a:pPr algn="ctr"/>
             <a:r>
-              <a:rPr lang="fr-FR" dirty="0" smtClean="0">
+              <a:rPr lang="fr-FR" dirty="0">
                 <a:solidFill>
                   <a:schemeClr val="tx1"/>
                 </a:solidFill>
               </a:rPr>
-              <a:t>Supprimer un utilisateur</a:t>
-            </a:r>
-            <a:endParaRPr lang="fr-FR" dirty="0">
-              <a:solidFill>
-                <a:schemeClr val="tx1"/>
-              </a:solidFill>
-            </a:endParaRPr>
+              <a:t>Condition : Salle déjà existante</a:t>
+            </a:r>
           </a:p>
         </p:txBody>
       </p:sp>
       <p:cxnSp>
         <p:nvCxnSpPr>
-          <p:cNvPr id="31" name="Connecteur droit 30">
-            <a:extLst>
-              <a:ext uri="{FF2B5EF4-FFF2-40B4-BE49-F238E27FC236}">
-                <a16:creationId xmlns:a16="http://schemas.microsoft.com/office/drawing/2014/main" xmlns="" id="{182766B4-113A-4456-9F5C-D5373D99B750}"/>
+          <p:cNvPr id="42" name="Connecteur droit 41">
+            <a:extLst>
+              <a:ext uri="{FF2B5EF4-FFF2-40B4-BE49-F238E27FC236}">
+                <a16:creationId xmlns:a16="http://schemas.microsoft.com/office/drawing/2014/main" id="{F5149114-A680-4536-BB33-63B2B107A752}"/>
               </a:ext>
             </a:extLst>
           </p:cNvPr>
           <p:cNvCxnSpPr>
             <a:cxnSpLocks/>
+            <a:stCxn id="41" idx="1"/>
           </p:cNvCxnSpPr>
           <p:nvPr/>
         </p:nvCxnSpPr>
         <p:spPr>
-          <a:xfrm>
-            <a:off x="2297723" y="3509108"/>
-            <a:ext cx="2352431" cy="1531815"/>
+          <a:xfrm flipH="1">
+            <a:off x="5478479" y="1871385"/>
+            <a:ext cx="1228843" cy="640684"/>
           </a:xfrm>
           <a:prstGeom prst="line">
             <a:avLst/>
           </a:prstGeom>
-          <a:ln>
+          <a:ln w="25400">
             <a:solidFill>
               <a:schemeClr val="tx1"/>
             </a:solidFill>
+            <a:prstDash val="lgDash"/>
           </a:ln>
         </p:spPr>
         <p:style>
@@ -4077,92 +4824,10 @@
           </a:fontRef>
         </p:style>
       </p:cxnSp>
-      <p:cxnSp>
-        <p:nvCxnSpPr>
-          <p:cNvPr id="38" name="Connecteur droit avec flèche 37">
-            <a:extLst>
-              <a:ext uri="{FF2B5EF4-FFF2-40B4-BE49-F238E27FC236}">
-                <a16:creationId xmlns:a16="http://schemas.microsoft.com/office/drawing/2014/main" xmlns="" id="{D186EB09-B5F6-4EE7-A72D-0599C9D2A89D}"/>
-              </a:ext>
-            </a:extLst>
-          </p:cNvPr>
-          <p:cNvCxnSpPr>
-            <a:cxnSpLocks/>
-            <a:endCxn id="12" idx="3"/>
-          </p:cNvCxnSpPr>
-          <p:nvPr/>
-        </p:nvCxnSpPr>
-        <p:spPr>
-          <a:xfrm flipV="1">
-            <a:off x="6800949" y="4140678"/>
-            <a:ext cx="2647324" cy="1043546"/>
-          </a:xfrm>
-          <a:prstGeom prst="straightConnector1">
-            <a:avLst/>
-          </a:prstGeom>
-          <a:ln w="28575">
-            <a:solidFill>
-              <a:schemeClr val="tx1"/>
-            </a:solidFill>
-            <a:prstDash val="lgDash"/>
-            <a:tailEnd type="arrow" w="lg" len="lg"/>
-          </a:ln>
-        </p:spPr>
-        <p:style>
-          <a:lnRef idx="1">
-            <a:schemeClr val="accent1"/>
-          </a:lnRef>
-          <a:fillRef idx="0">
-            <a:schemeClr val="accent1"/>
-          </a:fillRef>
-          <a:effectRef idx="0">
-            <a:schemeClr val="accent1"/>
-          </a:effectRef>
-          <a:fontRef idx="minor">
-            <a:schemeClr val="tx1"/>
-          </a:fontRef>
-        </p:style>
-      </p:cxnSp>
-      <p:sp>
-        <p:nvSpPr>
-          <p:cNvPr id="40" name="ZoneTexte 39">
-            <a:extLst>
-              <a:ext uri="{FF2B5EF4-FFF2-40B4-BE49-F238E27FC236}">
-                <a16:creationId xmlns:a16="http://schemas.microsoft.com/office/drawing/2014/main" xmlns="" id="{3E175212-5FF3-434B-A914-908ABCB0D72B}"/>
-              </a:ext>
-            </a:extLst>
-          </p:cNvPr>
-          <p:cNvSpPr txBox="1"/>
-          <p:nvPr/>
-        </p:nvSpPr>
-        <p:spPr>
-          <a:xfrm>
-            <a:off x="7591832" y="5004838"/>
-            <a:ext cx="1450600" cy="369332"/>
-          </a:xfrm>
-          <a:prstGeom prst="rect">
-            <a:avLst/>
-          </a:prstGeom>
-          <a:noFill/>
-        </p:spPr>
-        <p:txBody>
-          <a:bodyPr wrap="square" rtlCol="0">
-            <a:spAutoFit/>
-          </a:bodyPr>
-          <a:lstStyle/>
-          <a:p>
-            <a:pPr algn="ctr"/>
-            <a:r>
-              <a:rPr lang="fr-FR" dirty="0"/>
-              <a:t>&lt;&lt;include&gt;&gt;</a:t>
-            </a:r>
-          </a:p>
-        </p:txBody>
-      </p:sp>
     </p:spTree>
     <p:extLst>
       <p:ext uri="{BB962C8B-B14F-4D97-AF65-F5344CB8AC3E}">
-        <p14:creationId xmlns:p14="http://schemas.microsoft.com/office/powerpoint/2010/main" xmlns="" val="898712602"/>
+        <p14:creationId xmlns:p14="http://schemas.microsoft.com/office/powerpoint/2010/main" val="898712602"/>
       </p:ext>
     </p:extLst>
   </p:cSld>
@@ -4194,7 +4859,7 @@
           <p:cNvPr id="14" name="Rectangle 13">
             <a:extLst>
               <a:ext uri="{FF2B5EF4-FFF2-40B4-BE49-F238E27FC236}">
-                <a16:creationId xmlns:a16="http://schemas.microsoft.com/office/drawing/2014/main" xmlns="" id="{850A9AB0-F14E-47A9-A2BC-626368448D7B}"/>
+                <a16:creationId xmlns:a16="http://schemas.microsoft.com/office/drawing/2014/main" id="{850A9AB0-F14E-47A9-A2BC-626368448D7B}"/>
               </a:ext>
             </a:extLst>
           </p:cNvPr>
@@ -4248,7 +4913,7 @@
           <p:cNvPr id="7" name="Image 6">
             <a:extLst>
               <a:ext uri="{FF2B5EF4-FFF2-40B4-BE49-F238E27FC236}">
-                <a16:creationId xmlns:a16="http://schemas.microsoft.com/office/drawing/2014/main" xmlns="" id="{7EA3BBB4-6372-4F91-A449-831237C5C455}"/>
+                <a16:creationId xmlns:a16="http://schemas.microsoft.com/office/drawing/2014/main" id="{7EA3BBB4-6372-4F91-A449-831237C5C455}"/>
               </a:ext>
             </a:extLst>
           </p:cNvPr>
@@ -4261,10 +4926,10 @@
           <a:blip r:embed="rId2" cstate="print">
             <a:extLst>
               <a:ext uri="{28A0092B-C50C-407E-A947-70E740481C1C}">
-                <a14:useLocalDpi xmlns:a14="http://schemas.microsoft.com/office/drawing/2010/main" xmlns="" val="0"/>
+                <a14:useLocalDpi xmlns:a14="http://schemas.microsoft.com/office/drawing/2010/main" val="0"/>
               </a:ext>
               <a:ext uri="{837473B0-CC2E-450A-ABE3-18F120FF3D39}">
-                <a1611:picAttrSrcUrl xmlns:a1611="http://schemas.microsoft.com/office/drawing/2016/11/main" xmlns="" r:id="rId3"/>
+                <a1611:picAttrSrcUrl xmlns:a1611="http://schemas.microsoft.com/office/drawing/2016/11/main" r:id="rId3"/>
               </a:ext>
             </a:extLst>
           </a:blip>
@@ -4287,7 +4952,7 @@
           <p:cNvPr id="11" name="ZoneTexte 10">
             <a:extLst>
               <a:ext uri="{FF2B5EF4-FFF2-40B4-BE49-F238E27FC236}">
-                <a16:creationId xmlns:a16="http://schemas.microsoft.com/office/drawing/2014/main" xmlns="" id="{82AB6933-3476-43A6-848A-40D65BD00D18}"/>
+                <a16:creationId xmlns:a16="http://schemas.microsoft.com/office/drawing/2014/main" id="{82AB6933-3476-43A6-848A-40D65BD00D18}"/>
               </a:ext>
             </a:extLst>
           </p:cNvPr>
@@ -4312,7 +4977,7 @@
           <a:p>
             <a:pPr algn="ctr"/>
             <a:r>
-              <a:rPr lang="fr-FR" dirty="0" err="1" smtClean="0"/>
+              <a:rPr lang="fr-FR" dirty="0" err="1"/>
               <a:t>Admin</a:t>
             </a:r>
             <a:endParaRPr lang="fr-FR" dirty="0"/>
@@ -4324,7 +4989,7 @@
           <p:cNvPr id="12" name="Ellipse 11">
             <a:extLst>
               <a:ext uri="{FF2B5EF4-FFF2-40B4-BE49-F238E27FC236}">
-                <a16:creationId xmlns:a16="http://schemas.microsoft.com/office/drawing/2014/main" xmlns="" id="{A162F983-7EC5-49AA-BC55-8E730BD05A97}"/>
+                <a16:creationId xmlns:a16="http://schemas.microsoft.com/office/drawing/2014/main" id="{A162F983-7EC5-49AA-BC55-8E730BD05A97}"/>
               </a:ext>
             </a:extLst>
           </p:cNvPr>
@@ -4385,7 +5050,7 @@
           <p:cNvPr id="33" name="Ellipse 32">
             <a:extLst>
               <a:ext uri="{FF2B5EF4-FFF2-40B4-BE49-F238E27FC236}">
-                <a16:creationId xmlns:a16="http://schemas.microsoft.com/office/drawing/2014/main" xmlns="" id="{6D38FFAD-5DE0-4B65-8D2E-174388C79FC3}"/>
+                <a16:creationId xmlns:a16="http://schemas.microsoft.com/office/drawing/2014/main" id="{6D38FFAD-5DE0-4B65-8D2E-174388C79FC3}"/>
               </a:ext>
             </a:extLst>
           </p:cNvPr>
@@ -4431,18 +5096,13 @@
           <a:p>
             <a:pPr algn="ctr"/>
             <a:r>
-              <a:rPr lang="fr-FR" dirty="0" smtClean="0">
+              <a:rPr lang="fr-FR" dirty="0">
                 <a:solidFill>
                   <a:schemeClr val="tx1"/>
                 </a:solidFill>
               </a:rPr>
               <a:t>Modifier une salle</a:t>
             </a:r>
-            <a:endParaRPr lang="fr-FR" dirty="0">
-              <a:solidFill>
-                <a:schemeClr val="tx1"/>
-              </a:solidFill>
-            </a:endParaRPr>
           </a:p>
         </p:txBody>
       </p:sp>
@@ -4451,7 +5111,7 @@
           <p:cNvPr id="13" name="Ellipse 12">
             <a:extLst>
               <a:ext uri="{FF2B5EF4-FFF2-40B4-BE49-F238E27FC236}">
-                <a16:creationId xmlns:a16="http://schemas.microsoft.com/office/drawing/2014/main" xmlns="" id="{C34807EB-0774-443D-B5C9-C7C8424BC2CB}"/>
+                <a16:creationId xmlns:a16="http://schemas.microsoft.com/office/drawing/2014/main" id="{C34807EB-0774-443D-B5C9-C7C8424BC2CB}"/>
               </a:ext>
             </a:extLst>
           </p:cNvPr>
@@ -4497,18 +5157,13 @@
           <a:p>
             <a:pPr algn="ctr"/>
             <a:r>
-              <a:rPr lang="fr-FR" dirty="0" smtClean="0">
+              <a:rPr lang="fr-FR" dirty="0">
                 <a:solidFill>
                   <a:schemeClr val="tx1"/>
                 </a:solidFill>
               </a:rPr>
               <a:t>Ajouter une salle</a:t>
             </a:r>
-            <a:endParaRPr lang="fr-FR" dirty="0">
-              <a:solidFill>
-                <a:schemeClr val="tx1"/>
-              </a:solidFill>
-            </a:endParaRPr>
           </a:p>
         </p:txBody>
       </p:sp>
@@ -4517,7 +5172,7 @@
           <p:cNvPr id="4" name="Connecteur droit 3">
             <a:extLst>
               <a:ext uri="{FF2B5EF4-FFF2-40B4-BE49-F238E27FC236}">
-                <a16:creationId xmlns:a16="http://schemas.microsoft.com/office/drawing/2014/main" xmlns="" id="{94EE7817-952C-46F9-AEA1-B12C445AA075}"/>
+                <a16:creationId xmlns:a16="http://schemas.microsoft.com/office/drawing/2014/main" id="{94EE7817-952C-46F9-AEA1-B12C445AA075}"/>
               </a:ext>
             </a:extLst>
           </p:cNvPr>
@@ -4562,7 +5217,7 @@
           <p:cNvPr id="23" name="Connecteur droit avec flèche 22">
             <a:extLst>
               <a:ext uri="{FF2B5EF4-FFF2-40B4-BE49-F238E27FC236}">
-                <a16:creationId xmlns:a16="http://schemas.microsoft.com/office/drawing/2014/main" xmlns="" id="{D4187190-3D83-40A7-A51B-78582ED94F37}"/>
+                <a16:creationId xmlns:a16="http://schemas.microsoft.com/office/drawing/2014/main" id="{D4187190-3D83-40A7-A51B-78582ED94F37}"/>
               </a:ext>
             </a:extLst>
           </p:cNvPr>
@@ -4609,7 +5264,7 @@
           <p:cNvPr id="24" name="ZoneTexte 23">
             <a:extLst>
               <a:ext uri="{FF2B5EF4-FFF2-40B4-BE49-F238E27FC236}">
-                <a16:creationId xmlns:a16="http://schemas.microsoft.com/office/drawing/2014/main" xmlns="" id="{C80D4B28-9F40-48AD-A21B-63B73871B3B9}"/>
+                <a16:creationId xmlns:a16="http://schemas.microsoft.com/office/drawing/2014/main" id="{C80D4B28-9F40-48AD-A21B-63B73871B3B9}"/>
               </a:ext>
             </a:extLst>
           </p:cNvPr>
@@ -4645,7 +5300,7 @@
           <p:cNvPr id="35" name="Connecteur droit 34">
             <a:extLst>
               <a:ext uri="{FF2B5EF4-FFF2-40B4-BE49-F238E27FC236}">
-                <a16:creationId xmlns:a16="http://schemas.microsoft.com/office/drawing/2014/main" xmlns="" id="{182766B4-113A-4456-9F5C-D5373D99B750}"/>
+                <a16:creationId xmlns:a16="http://schemas.microsoft.com/office/drawing/2014/main" id="{182766B4-113A-4456-9F5C-D5373D99B750}"/>
               </a:ext>
             </a:extLst>
           </p:cNvPr>
@@ -4690,7 +5345,7 @@
           <p:cNvPr id="36" name="Connecteur droit avec flèche 35">
             <a:extLst>
               <a:ext uri="{FF2B5EF4-FFF2-40B4-BE49-F238E27FC236}">
-                <a16:creationId xmlns:a16="http://schemas.microsoft.com/office/drawing/2014/main" xmlns="" id="{D186EB09-B5F6-4EE7-A72D-0599C9D2A89D}"/>
+                <a16:creationId xmlns:a16="http://schemas.microsoft.com/office/drawing/2014/main" id="{D186EB09-B5F6-4EE7-A72D-0599C9D2A89D}"/>
               </a:ext>
             </a:extLst>
           </p:cNvPr>
@@ -4737,7 +5392,7 @@
           <p:cNvPr id="37" name="ZoneTexte 36">
             <a:extLst>
               <a:ext uri="{FF2B5EF4-FFF2-40B4-BE49-F238E27FC236}">
-                <a16:creationId xmlns:a16="http://schemas.microsoft.com/office/drawing/2014/main" xmlns="" id="{3E175212-5FF3-434B-A914-908ABCB0D72B}"/>
+                <a16:creationId xmlns:a16="http://schemas.microsoft.com/office/drawing/2014/main" id="{3E175212-5FF3-434B-A914-908ABCB0D72B}"/>
               </a:ext>
             </a:extLst>
           </p:cNvPr>
@@ -4773,7 +5428,7 @@
           <p:cNvPr id="15" name="ZoneTexte 14">
             <a:extLst>
               <a:ext uri="{FF2B5EF4-FFF2-40B4-BE49-F238E27FC236}">
-                <a16:creationId xmlns:a16="http://schemas.microsoft.com/office/drawing/2014/main" xmlns="" id="{55F82F66-8C5A-42B4-9C56-1F7A68FA578A}"/>
+                <a16:creationId xmlns:a16="http://schemas.microsoft.com/office/drawing/2014/main" id="{55F82F66-8C5A-42B4-9C56-1F7A68FA578A}"/>
               </a:ext>
             </a:extLst>
           </p:cNvPr>
@@ -4798,14 +5453,13 @@
           <a:p>
             <a:pPr algn="ctr"/>
             <a:r>
-              <a:rPr lang="fr-FR" b="1" u="sng" dirty="0" err="1" smtClean="0"/>
+              <a:rPr lang="fr-FR" b="1" u="sng" dirty="0" err="1"/>
               <a:t>Admin</a:t>
             </a:r>
             <a:r>
-              <a:rPr lang="fr-FR" b="1" u="sng" dirty="0" smtClean="0"/>
+              <a:rPr lang="fr-FR" b="1" u="sng" dirty="0"/>
               <a:t> : Gestion des salles</a:t>
             </a:r>
-            <a:endParaRPr lang="fr-FR" b="1" u="sng" dirty="0"/>
           </a:p>
         </p:txBody>
       </p:sp>
@@ -4814,7 +5468,7 @@
           <p:cNvPr id="18" name="Ellipse 17">
             <a:extLst>
               <a:ext uri="{FF2B5EF4-FFF2-40B4-BE49-F238E27FC236}">
-                <a16:creationId xmlns:a16="http://schemas.microsoft.com/office/drawing/2014/main" xmlns="" id="{6D38FFAD-5DE0-4B65-8D2E-174388C79FC3}"/>
+                <a16:creationId xmlns:a16="http://schemas.microsoft.com/office/drawing/2014/main" id="{6D38FFAD-5DE0-4B65-8D2E-174388C79FC3}"/>
               </a:ext>
             </a:extLst>
           </p:cNvPr>
@@ -4860,18 +5514,13 @@
           <a:p>
             <a:pPr algn="ctr"/>
             <a:r>
-              <a:rPr lang="fr-FR" dirty="0" smtClean="0">
+              <a:rPr lang="fr-FR" dirty="0">
                 <a:solidFill>
                   <a:schemeClr val="tx1"/>
                 </a:solidFill>
               </a:rPr>
               <a:t>Supprimer une salle</a:t>
             </a:r>
-            <a:endParaRPr lang="fr-FR" dirty="0">
-              <a:solidFill>
-                <a:schemeClr val="tx1"/>
-              </a:solidFill>
-            </a:endParaRPr>
           </a:p>
         </p:txBody>
       </p:sp>
@@ -4880,7 +5529,7 @@
           <p:cNvPr id="19" name="Connecteur droit 18">
             <a:extLst>
               <a:ext uri="{FF2B5EF4-FFF2-40B4-BE49-F238E27FC236}">
-                <a16:creationId xmlns:a16="http://schemas.microsoft.com/office/drawing/2014/main" xmlns="" id="{182766B4-113A-4456-9F5C-D5373D99B750}"/>
+                <a16:creationId xmlns:a16="http://schemas.microsoft.com/office/drawing/2014/main" id="{182766B4-113A-4456-9F5C-D5373D99B750}"/>
               </a:ext>
             </a:extLst>
           </p:cNvPr>
@@ -4923,7 +5572,7 @@
           <p:cNvPr id="25" name="Connecteur droit avec flèche 24">
             <a:extLst>
               <a:ext uri="{FF2B5EF4-FFF2-40B4-BE49-F238E27FC236}">
-                <a16:creationId xmlns:a16="http://schemas.microsoft.com/office/drawing/2014/main" xmlns="" id="{D186EB09-B5F6-4EE7-A72D-0599C9D2A89D}"/>
+                <a16:creationId xmlns:a16="http://schemas.microsoft.com/office/drawing/2014/main" id="{D186EB09-B5F6-4EE7-A72D-0599C9D2A89D}"/>
               </a:ext>
             </a:extLst>
           </p:cNvPr>
@@ -4970,7 +5619,7 @@
           <p:cNvPr id="28" name="ZoneTexte 27">
             <a:extLst>
               <a:ext uri="{FF2B5EF4-FFF2-40B4-BE49-F238E27FC236}">
-                <a16:creationId xmlns:a16="http://schemas.microsoft.com/office/drawing/2014/main" xmlns="" id="{3E175212-5FF3-434B-A914-908ABCB0D72B}"/>
+                <a16:creationId xmlns:a16="http://schemas.microsoft.com/office/drawing/2014/main" id="{3E175212-5FF3-434B-A914-908ABCB0D72B}"/>
               </a:ext>
             </a:extLst>
           </p:cNvPr>
@@ -5004,7 +5653,7 @@
     </p:spTree>
     <p:extLst>
       <p:ext uri="{BB962C8B-B14F-4D97-AF65-F5344CB8AC3E}">
-        <p14:creationId xmlns:p14="http://schemas.microsoft.com/office/powerpoint/2010/main" xmlns="" val="2314106320"/>
+        <p14:creationId xmlns:p14="http://schemas.microsoft.com/office/powerpoint/2010/main" val="2314106320"/>
       </p:ext>
     </p:extLst>
   </p:cSld>
@@ -5036,7 +5685,7 @@
           <p:cNvPr id="14" name="Rectangle 13">
             <a:extLst>
               <a:ext uri="{FF2B5EF4-FFF2-40B4-BE49-F238E27FC236}">
-                <a16:creationId xmlns:a16="http://schemas.microsoft.com/office/drawing/2014/main" xmlns="" id="{4AA490E2-9F69-49C9-B109-70A834B9E4D9}"/>
+                <a16:creationId xmlns:a16="http://schemas.microsoft.com/office/drawing/2014/main" id="{4AA490E2-9F69-49C9-B109-70A834B9E4D9}"/>
               </a:ext>
             </a:extLst>
           </p:cNvPr>
@@ -5090,7 +5739,7 @@
           <p:cNvPr id="7" name="Image 6">
             <a:extLst>
               <a:ext uri="{FF2B5EF4-FFF2-40B4-BE49-F238E27FC236}">
-                <a16:creationId xmlns:a16="http://schemas.microsoft.com/office/drawing/2014/main" xmlns="" id="{7EA3BBB4-6372-4F91-A449-831237C5C455}"/>
+                <a16:creationId xmlns:a16="http://schemas.microsoft.com/office/drawing/2014/main" id="{7EA3BBB4-6372-4F91-A449-831237C5C455}"/>
               </a:ext>
             </a:extLst>
           </p:cNvPr>
@@ -5103,10 +5752,10 @@
           <a:blip r:embed="rId2" cstate="print">
             <a:extLst>
               <a:ext uri="{28A0092B-C50C-407E-A947-70E740481C1C}">
-                <a14:useLocalDpi xmlns:a14="http://schemas.microsoft.com/office/drawing/2010/main" xmlns="" val="0"/>
+                <a14:useLocalDpi xmlns:a14="http://schemas.microsoft.com/office/drawing/2010/main" val="0"/>
               </a:ext>
               <a:ext uri="{837473B0-CC2E-450A-ABE3-18F120FF3D39}">
-                <a1611:picAttrSrcUrl xmlns:a1611="http://schemas.microsoft.com/office/drawing/2016/11/main" xmlns="" r:id="rId3"/>
+                <a1611:picAttrSrcUrl xmlns:a1611="http://schemas.microsoft.com/office/drawing/2016/11/main" r:id="rId3"/>
               </a:ext>
             </a:extLst>
           </a:blip>
@@ -5129,7 +5778,7 @@
           <p:cNvPr id="11" name="ZoneTexte 10">
             <a:extLst>
               <a:ext uri="{FF2B5EF4-FFF2-40B4-BE49-F238E27FC236}">
-                <a16:creationId xmlns:a16="http://schemas.microsoft.com/office/drawing/2014/main" xmlns="" id="{82AB6933-3476-43A6-848A-40D65BD00D18}"/>
+                <a16:creationId xmlns:a16="http://schemas.microsoft.com/office/drawing/2014/main" id="{82AB6933-3476-43A6-848A-40D65BD00D18}"/>
               </a:ext>
             </a:extLst>
           </p:cNvPr>
@@ -5154,7 +5803,7 @@
           <a:p>
             <a:pPr algn="ctr"/>
             <a:r>
-              <a:rPr lang="fr-FR" dirty="0" err="1" smtClean="0"/>
+              <a:rPr lang="fr-FR" dirty="0" err="1"/>
               <a:t>Admin</a:t>
             </a:r>
             <a:endParaRPr lang="fr-FR" dirty="0"/>
@@ -5166,7 +5815,7 @@
           <p:cNvPr id="12" name="Ellipse 11">
             <a:extLst>
               <a:ext uri="{FF2B5EF4-FFF2-40B4-BE49-F238E27FC236}">
-                <a16:creationId xmlns:a16="http://schemas.microsoft.com/office/drawing/2014/main" xmlns="" id="{A162F983-7EC5-49AA-BC55-8E730BD05A97}"/>
+                <a16:creationId xmlns:a16="http://schemas.microsoft.com/office/drawing/2014/main" id="{A162F983-7EC5-49AA-BC55-8E730BD05A97}"/>
               </a:ext>
             </a:extLst>
           </p:cNvPr>
@@ -5227,7 +5876,7 @@
           <p:cNvPr id="33" name="Ellipse 32">
             <a:extLst>
               <a:ext uri="{FF2B5EF4-FFF2-40B4-BE49-F238E27FC236}">
-                <a16:creationId xmlns:a16="http://schemas.microsoft.com/office/drawing/2014/main" xmlns="" id="{6D38FFAD-5DE0-4B65-8D2E-174388C79FC3}"/>
+                <a16:creationId xmlns:a16="http://schemas.microsoft.com/office/drawing/2014/main" id="{6D38FFAD-5DE0-4B65-8D2E-174388C79FC3}"/>
               </a:ext>
             </a:extLst>
           </p:cNvPr>
@@ -5278,21 +5927,8 @@
                   <a:schemeClr val="tx1"/>
                 </a:solidFill>
               </a:rPr>
-              <a:t>Ajouter une </a:t>
-            </a:r>
-            <a:r>
-              <a:rPr lang="fr-FR" dirty="0" smtClean="0">
-                <a:solidFill>
-                  <a:schemeClr val="tx1"/>
-                </a:solidFill>
-              </a:rPr>
-              <a:t>ligue</a:t>
-            </a:r>
-            <a:endParaRPr lang="fr-FR" dirty="0">
-              <a:solidFill>
-                <a:schemeClr val="tx1"/>
-              </a:solidFill>
-            </a:endParaRPr>
+              <a:t>Ajouter une ligue</a:t>
+            </a:r>
           </a:p>
         </p:txBody>
       </p:sp>
@@ -5301,7 +5937,7 @@
           <p:cNvPr id="35" name="Connecteur droit 34">
             <a:extLst>
               <a:ext uri="{FF2B5EF4-FFF2-40B4-BE49-F238E27FC236}">
-                <a16:creationId xmlns:a16="http://schemas.microsoft.com/office/drawing/2014/main" xmlns="" id="{182766B4-113A-4456-9F5C-D5373D99B750}"/>
+                <a16:creationId xmlns:a16="http://schemas.microsoft.com/office/drawing/2014/main" id="{182766B4-113A-4456-9F5C-D5373D99B750}"/>
               </a:ext>
             </a:extLst>
           </p:cNvPr>
@@ -5346,7 +5982,7 @@
           <p:cNvPr id="36" name="Connecteur droit avec flèche 35">
             <a:extLst>
               <a:ext uri="{FF2B5EF4-FFF2-40B4-BE49-F238E27FC236}">
-                <a16:creationId xmlns:a16="http://schemas.microsoft.com/office/drawing/2014/main" xmlns="" id="{D186EB09-B5F6-4EE7-A72D-0599C9D2A89D}"/>
+                <a16:creationId xmlns:a16="http://schemas.microsoft.com/office/drawing/2014/main" id="{D186EB09-B5F6-4EE7-A72D-0599C9D2A89D}"/>
               </a:ext>
             </a:extLst>
           </p:cNvPr>
@@ -5393,7 +6029,7 @@
           <p:cNvPr id="37" name="ZoneTexte 36">
             <a:extLst>
               <a:ext uri="{FF2B5EF4-FFF2-40B4-BE49-F238E27FC236}">
-                <a16:creationId xmlns:a16="http://schemas.microsoft.com/office/drawing/2014/main" xmlns="" id="{3E175212-5FF3-434B-A914-908ABCB0D72B}"/>
+                <a16:creationId xmlns:a16="http://schemas.microsoft.com/office/drawing/2014/main" id="{3E175212-5FF3-434B-A914-908ABCB0D72B}"/>
               </a:ext>
             </a:extLst>
           </p:cNvPr>
@@ -5429,7 +6065,7 @@
           <p:cNvPr id="15" name="ZoneTexte 14">
             <a:extLst>
               <a:ext uri="{FF2B5EF4-FFF2-40B4-BE49-F238E27FC236}">
-                <a16:creationId xmlns:a16="http://schemas.microsoft.com/office/drawing/2014/main" xmlns="" id="{389E83B1-7A40-4AC5-9EBB-F62735AA4623}"/>
+                <a16:creationId xmlns:a16="http://schemas.microsoft.com/office/drawing/2014/main" id="{389E83B1-7A40-4AC5-9EBB-F62735AA4623}"/>
               </a:ext>
             </a:extLst>
           </p:cNvPr>
@@ -5454,14 +6090,13 @@
           <a:p>
             <a:pPr algn="ctr"/>
             <a:r>
-              <a:rPr lang="fr-FR" b="1" u="sng" dirty="0" err="1" smtClean="0"/>
+              <a:rPr lang="fr-FR" b="1" u="sng" dirty="0" err="1"/>
               <a:t>Admin</a:t>
             </a:r>
             <a:r>
-              <a:rPr lang="fr-FR" b="1" u="sng" dirty="0" smtClean="0"/>
+              <a:rPr lang="fr-FR" b="1" u="sng" dirty="0"/>
               <a:t> : Gestion des ligues</a:t>
             </a:r>
-            <a:endParaRPr lang="fr-FR" b="1" u="sng" dirty="0"/>
           </a:p>
         </p:txBody>
       </p:sp>
@@ -5470,7 +6105,7 @@
           <p:cNvPr id="17" name="Ellipse 16">
             <a:extLst>
               <a:ext uri="{FF2B5EF4-FFF2-40B4-BE49-F238E27FC236}">
-                <a16:creationId xmlns:a16="http://schemas.microsoft.com/office/drawing/2014/main" xmlns="" id="{6D38FFAD-5DE0-4B65-8D2E-174388C79FC3}"/>
+                <a16:creationId xmlns:a16="http://schemas.microsoft.com/office/drawing/2014/main" id="{6D38FFAD-5DE0-4B65-8D2E-174388C79FC3}"/>
               </a:ext>
             </a:extLst>
           </p:cNvPr>
@@ -5516,18 +6151,13 @@
           <a:p>
             <a:pPr algn="ctr"/>
             <a:r>
-              <a:rPr lang="fr-FR" dirty="0" smtClean="0">
+              <a:rPr lang="fr-FR" dirty="0">
                 <a:solidFill>
                   <a:schemeClr val="tx1"/>
                 </a:solidFill>
               </a:rPr>
               <a:t>Modifier une ligue</a:t>
             </a:r>
-            <a:endParaRPr lang="fr-FR" dirty="0">
-              <a:solidFill>
-                <a:schemeClr val="tx1"/>
-              </a:solidFill>
-            </a:endParaRPr>
           </a:p>
         </p:txBody>
       </p:sp>
@@ -5536,7 +6166,7 @@
           <p:cNvPr id="18" name="Ellipse 17">
             <a:extLst>
               <a:ext uri="{FF2B5EF4-FFF2-40B4-BE49-F238E27FC236}">
-                <a16:creationId xmlns:a16="http://schemas.microsoft.com/office/drawing/2014/main" xmlns="" id="{6D38FFAD-5DE0-4B65-8D2E-174388C79FC3}"/>
+                <a16:creationId xmlns:a16="http://schemas.microsoft.com/office/drawing/2014/main" id="{6D38FFAD-5DE0-4B65-8D2E-174388C79FC3}"/>
               </a:ext>
             </a:extLst>
           </p:cNvPr>
@@ -5582,18 +6212,13 @@
           <a:p>
             <a:pPr algn="ctr"/>
             <a:r>
-              <a:rPr lang="fr-FR" dirty="0" smtClean="0">
+              <a:rPr lang="fr-FR" dirty="0">
                 <a:solidFill>
                   <a:schemeClr val="tx1"/>
                 </a:solidFill>
               </a:rPr>
               <a:t>Supprimer une ligue</a:t>
             </a:r>
-            <a:endParaRPr lang="fr-FR" dirty="0">
-              <a:solidFill>
-                <a:schemeClr val="tx1"/>
-              </a:solidFill>
-            </a:endParaRPr>
           </a:p>
         </p:txBody>
       </p:sp>
@@ -5602,7 +6227,7 @@
           <p:cNvPr id="19" name="Connecteur droit 18">
             <a:extLst>
               <a:ext uri="{FF2B5EF4-FFF2-40B4-BE49-F238E27FC236}">
-                <a16:creationId xmlns:a16="http://schemas.microsoft.com/office/drawing/2014/main" xmlns="" id="{182766B4-113A-4456-9F5C-D5373D99B750}"/>
+                <a16:creationId xmlns:a16="http://schemas.microsoft.com/office/drawing/2014/main" id="{182766B4-113A-4456-9F5C-D5373D99B750}"/>
               </a:ext>
             </a:extLst>
           </p:cNvPr>
@@ -5647,7 +6272,7 @@
           <p:cNvPr id="22" name="Connecteur droit 21">
             <a:extLst>
               <a:ext uri="{FF2B5EF4-FFF2-40B4-BE49-F238E27FC236}">
-                <a16:creationId xmlns:a16="http://schemas.microsoft.com/office/drawing/2014/main" xmlns="" id="{182766B4-113A-4456-9F5C-D5373D99B750}"/>
+                <a16:creationId xmlns:a16="http://schemas.microsoft.com/office/drawing/2014/main" id="{182766B4-113A-4456-9F5C-D5373D99B750}"/>
               </a:ext>
             </a:extLst>
           </p:cNvPr>
@@ -5692,7 +6317,7 @@
           <p:cNvPr id="30" name="Connecteur droit avec flèche 29">
             <a:extLst>
               <a:ext uri="{FF2B5EF4-FFF2-40B4-BE49-F238E27FC236}">
-                <a16:creationId xmlns:a16="http://schemas.microsoft.com/office/drawing/2014/main" xmlns="" id="{D186EB09-B5F6-4EE7-A72D-0599C9D2A89D}"/>
+                <a16:creationId xmlns:a16="http://schemas.microsoft.com/office/drawing/2014/main" id="{D186EB09-B5F6-4EE7-A72D-0599C9D2A89D}"/>
               </a:ext>
             </a:extLst>
           </p:cNvPr>
@@ -5739,7 +6364,7 @@
           <p:cNvPr id="38" name="Connecteur droit avec flèche 37">
             <a:extLst>
               <a:ext uri="{FF2B5EF4-FFF2-40B4-BE49-F238E27FC236}">
-                <a16:creationId xmlns:a16="http://schemas.microsoft.com/office/drawing/2014/main" xmlns="" id="{D186EB09-B5F6-4EE7-A72D-0599C9D2A89D}"/>
+                <a16:creationId xmlns:a16="http://schemas.microsoft.com/office/drawing/2014/main" id="{D186EB09-B5F6-4EE7-A72D-0599C9D2A89D}"/>
               </a:ext>
             </a:extLst>
           </p:cNvPr>
@@ -5786,7 +6411,7 @@
           <p:cNvPr id="41" name="ZoneTexte 40">
             <a:extLst>
               <a:ext uri="{FF2B5EF4-FFF2-40B4-BE49-F238E27FC236}">
-                <a16:creationId xmlns:a16="http://schemas.microsoft.com/office/drawing/2014/main" xmlns="" id="{3E175212-5FF3-434B-A914-908ABCB0D72B}"/>
+                <a16:creationId xmlns:a16="http://schemas.microsoft.com/office/drawing/2014/main" id="{3E175212-5FF3-434B-A914-908ABCB0D72B}"/>
               </a:ext>
             </a:extLst>
           </p:cNvPr>
@@ -5822,7 +6447,7 @@
           <p:cNvPr id="42" name="ZoneTexte 41">
             <a:extLst>
               <a:ext uri="{FF2B5EF4-FFF2-40B4-BE49-F238E27FC236}">
-                <a16:creationId xmlns:a16="http://schemas.microsoft.com/office/drawing/2014/main" xmlns="" id="{3E175212-5FF3-434B-A914-908ABCB0D72B}"/>
+                <a16:creationId xmlns:a16="http://schemas.microsoft.com/office/drawing/2014/main" id="{3E175212-5FF3-434B-A914-908ABCB0D72B}"/>
               </a:ext>
             </a:extLst>
           </p:cNvPr>
@@ -5856,7 +6481,7 @@
     </p:spTree>
     <p:extLst>
       <p:ext uri="{BB962C8B-B14F-4D97-AF65-F5344CB8AC3E}">
-        <p14:creationId xmlns:p14="http://schemas.microsoft.com/office/powerpoint/2010/main" xmlns="" val="4120669317"/>
+        <p14:creationId xmlns:p14="http://schemas.microsoft.com/office/powerpoint/2010/main" val="4120669317"/>
       </p:ext>
     </p:extLst>
   </p:cSld>
@@ -5888,7 +6513,7 @@
           <p:cNvPr id="49" name="Rectangle 48">
             <a:extLst>
               <a:ext uri="{FF2B5EF4-FFF2-40B4-BE49-F238E27FC236}">
-                <a16:creationId xmlns:a16="http://schemas.microsoft.com/office/drawing/2014/main" xmlns="" id="{2B9C05B6-9158-4CD2-8369-63D13E10DC87}"/>
+                <a16:creationId xmlns:a16="http://schemas.microsoft.com/office/drawing/2014/main" id="{2B9C05B6-9158-4CD2-8369-63D13E10DC87}"/>
               </a:ext>
             </a:extLst>
           </p:cNvPr>
@@ -5942,7 +6567,7 @@
           <p:cNvPr id="50" name="ZoneTexte 49">
             <a:extLst>
               <a:ext uri="{FF2B5EF4-FFF2-40B4-BE49-F238E27FC236}">
-                <a16:creationId xmlns:a16="http://schemas.microsoft.com/office/drawing/2014/main" xmlns="" id="{BD2B217A-AE57-4719-96C9-E4AED82EEDFA}"/>
+                <a16:creationId xmlns:a16="http://schemas.microsoft.com/office/drawing/2014/main" id="{BD2B217A-AE57-4719-96C9-E4AED82EEDFA}"/>
               </a:ext>
             </a:extLst>
           </p:cNvPr>
@@ -5967,10 +6592,9 @@
           <a:p>
             <a:pPr algn="ctr"/>
             <a:r>
-              <a:rPr lang="fr-FR" b="1" u="sng" dirty="0" smtClean="0"/>
+              <a:rPr lang="fr-FR" b="1" u="sng" dirty="0"/>
               <a:t>Utilisateur : réservation créneau</a:t>
             </a:r>
-            <a:endParaRPr lang="fr-FR" b="1" u="sng" dirty="0"/>
           </a:p>
         </p:txBody>
       </p:sp>
@@ -5979,7 +6603,7 @@
           <p:cNvPr id="7" name="Image 6">
             <a:extLst>
               <a:ext uri="{FF2B5EF4-FFF2-40B4-BE49-F238E27FC236}">
-                <a16:creationId xmlns:a16="http://schemas.microsoft.com/office/drawing/2014/main" xmlns="" id="{7EA3BBB4-6372-4F91-A449-831237C5C455}"/>
+                <a16:creationId xmlns:a16="http://schemas.microsoft.com/office/drawing/2014/main" id="{7EA3BBB4-6372-4F91-A449-831237C5C455}"/>
               </a:ext>
             </a:extLst>
           </p:cNvPr>
@@ -5992,10 +6616,10 @@
           <a:blip r:embed="rId2" cstate="print">
             <a:extLst>
               <a:ext uri="{28A0092B-C50C-407E-A947-70E740481C1C}">
-                <a14:useLocalDpi xmlns:a14="http://schemas.microsoft.com/office/drawing/2010/main" xmlns="" val="0"/>
+                <a14:useLocalDpi xmlns:a14="http://schemas.microsoft.com/office/drawing/2010/main" val="0"/>
               </a:ext>
               <a:ext uri="{837473B0-CC2E-450A-ABE3-18F120FF3D39}">
-                <a1611:picAttrSrcUrl xmlns:a1611="http://schemas.microsoft.com/office/drawing/2016/11/main" xmlns="" r:id="rId3"/>
+                <a1611:picAttrSrcUrl xmlns:a1611="http://schemas.microsoft.com/office/drawing/2016/11/main" r:id="rId3"/>
               </a:ext>
             </a:extLst>
           </a:blip>
@@ -6018,7 +6642,7 @@
           <p:cNvPr id="11" name="ZoneTexte 10">
             <a:extLst>
               <a:ext uri="{FF2B5EF4-FFF2-40B4-BE49-F238E27FC236}">
-                <a16:creationId xmlns:a16="http://schemas.microsoft.com/office/drawing/2014/main" xmlns="" id="{82AB6933-3476-43A6-848A-40D65BD00D18}"/>
+                <a16:creationId xmlns:a16="http://schemas.microsoft.com/office/drawing/2014/main" id="{82AB6933-3476-43A6-848A-40D65BD00D18}"/>
               </a:ext>
             </a:extLst>
           </p:cNvPr>
@@ -6043,10 +6667,9 @@
           <a:p>
             <a:pPr algn="ctr"/>
             <a:r>
-              <a:rPr lang="fr-FR" dirty="0" smtClean="0"/>
+              <a:rPr lang="fr-FR" dirty="0"/>
               <a:t>Utilisateur</a:t>
             </a:r>
-            <a:endParaRPr lang="fr-FR" dirty="0"/>
           </a:p>
         </p:txBody>
       </p:sp>
@@ -6055,7 +6678,7 @@
           <p:cNvPr id="12" name="Ellipse 11">
             <a:extLst>
               <a:ext uri="{FF2B5EF4-FFF2-40B4-BE49-F238E27FC236}">
-                <a16:creationId xmlns:a16="http://schemas.microsoft.com/office/drawing/2014/main" xmlns="" id="{A162F983-7EC5-49AA-BC55-8E730BD05A97}"/>
+                <a16:creationId xmlns:a16="http://schemas.microsoft.com/office/drawing/2014/main" id="{A162F983-7EC5-49AA-BC55-8E730BD05A97}"/>
               </a:ext>
             </a:extLst>
           </p:cNvPr>
@@ -6116,7 +6739,7 @@
           <p:cNvPr id="35" name="Connecteur droit 34">
             <a:extLst>
               <a:ext uri="{FF2B5EF4-FFF2-40B4-BE49-F238E27FC236}">
-                <a16:creationId xmlns:a16="http://schemas.microsoft.com/office/drawing/2014/main" xmlns="" id="{182766B4-113A-4456-9F5C-D5373D99B750}"/>
+                <a16:creationId xmlns:a16="http://schemas.microsoft.com/office/drawing/2014/main" id="{182766B4-113A-4456-9F5C-D5373D99B750}"/>
               </a:ext>
             </a:extLst>
           </p:cNvPr>
@@ -6161,7 +6784,7 @@
           <p:cNvPr id="36" name="Connecteur droit avec flèche 35">
             <a:extLst>
               <a:ext uri="{FF2B5EF4-FFF2-40B4-BE49-F238E27FC236}">
-                <a16:creationId xmlns:a16="http://schemas.microsoft.com/office/drawing/2014/main" xmlns="" id="{D186EB09-B5F6-4EE7-A72D-0599C9D2A89D}"/>
+                <a16:creationId xmlns:a16="http://schemas.microsoft.com/office/drawing/2014/main" id="{D186EB09-B5F6-4EE7-A72D-0599C9D2A89D}"/>
               </a:ext>
             </a:extLst>
           </p:cNvPr>
@@ -6208,7 +6831,7 @@
           <p:cNvPr id="44" name="Ellipse 43">
             <a:extLst>
               <a:ext uri="{FF2B5EF4-FFF2-40B4-BE49-F238E27FC236}">
-                <a16:creationId xmlns:a16="http://schemas.microsoft.com/office/drawing/2014/main" xmlns="" id="{D65E78B7-091C-4B94-8628-AAF4E91692C8}"/>
+                <a16:creationId xmlns:a16="http://schemas.microsoft.com/office/drawing/2014/main" id="{D65E78B7-091C-4B94-8628-AAF4E91692C8}"/>
               </a:ext>
             </a:extLst>
           </p:cNvPr>
@@ -6254,18 +6877,13 @@
           <a:p>
             <a:pPr algn="ctr"/>
             <a:r>
-              <a:rPr lang="fr-FR" dirty="0" smtClean="0">
+              <a:rPr lang="fr-FR" dirty="0">
                 <a:solidFill>
                   <a:schemeClr val="tx1"/>
                 </a:solidFill>
               </a:rPr>
-              <a:t>Supprimer l’une de ses réservations</a:t>
-            </a:r>
-            <a:endParaRPr lang="fr-FR" dirty="0">
-              <a:solidFill>
-                <a:schemeClr val="tx1"/>
-              </a:solidFill>
-            </a:endParaRPr>
+              <a:t>Supprimer une réservations</a:t>
+            </a:r>
           </a:p>
         </p:txBody>
       </p:sp>
@@ -6274,7 +6892,7 @@
           <p:cNvPr id="45" name="Connecteur droit 44">
             <a:extLst>
               <a:ext uri="{FF2B5EF4-FFF2-40B4-BE49-F238E27FC236}">
-                <a16:creationId xmlns:a16="http://schemas.microsoft.com/office/drawing/2014/main" xmlns="" id="{1C55AC5D-47B0-495A-B88A-39B17C4158F0}"/>
+                <a16:creationId xmlns:a16="http://schemas.microsoft.com/office/drawing/2014/main" id="{1C55AC5D-47B0-495A-B88A-39B17C4158F0}"/>
               </a:ext>
             </a:extLst>
           </p:cNvPr>
@@ -6319,7 +6937,7 @@
           <p:cNvPr id="58" name="ZoneTexte 57">
             <a:extLst>
               <a:ext uri="{FF2B5EF4-FFF2-40B4-BE49-F238E27FC236}">
-                <a16:creationId xmlns:a16="http://schemas.microsoft.com/office/drawing/2014/main" xmlns="" id="{87604058-1B12-4B9D-9E63-A16E06946CC8}"/>
+                <a16:creationId xmlns:a16="http://schemas.microsoft.com/office/drawing/2014/main" id="{87604058-1B12-4B9D-9E63-A16E06946CC8}"/>
               </a:ext>
             </a:extLst>
           </p:cNvPr>
@@ -6355,7 +6973,7 @@
           <p:cNvPr id="18" name="Ellipse 17">
             <a:extLst>
               <a:ext uri="{FF2B5EF4-FFF2-40B4-BE49-F238E27FC236}">
-                <a16:creationId xmlns:a16="http://schemas.microsoft.com/office/drawing/2014/main" xmlns="" id="{8DE5C593-10CE-40D9-9D92-7F092045A794}"/>
+                <a16:creationId xmlns:a16="http://schemas.microsoft.com/office/drawing/2014/main" id="{8DE5C593-10CE-40D9-9D92-7F092045A794}"/>
               </a:ext>
             </a:extLst>
           </p:cNvPr>
@@ -6401,18 +7019,13 @@
           <a:p>
             <a:pPr algn="ctr"/>
             <a:r>
-              <a:rPr lang="fr-FR" dirty="0" smtClean="0">
+              <a:rPr lang="fr-FR" dirty="0">
                 <a:solidFill>
                   <a:schemeClr val="tx1"/>
                 </a:solidFill>
               </a:rPr>
               <a:t>Visualiser une réservation</a:t>
             </a:r>
-            <a:endParaRPr lang="fr-FR" dirty="0">
-              <a:solidFill>
-                <a:schemeClr val="tx1"/>
-              </a:solidFill>
-            </a:endParaRPr>
           </a:p>
         </p:txBody>
       </p:sp>
@@ -6421,7 +7034,7 @@
           <p:cNvPr id="27" name="ZoneTexte 26">
             <a:extLst>
               <a:ext uri="{FF2B5EF4-FFF2-40B4-BE49-F238E27FC236}">
-                <a16:creationId xmlns:a16="http://schemas.microsoft.com/office/drawing/2014/main" xmlns="" id="{22E20B09-B403-4A80-BD1E-16819941E050}"/>
+                <a16:creationId xmlns:a16="http://schemas.microsoft.com/office/drawing/2014/main" id="{22E20B09-B403-4A80-BD1E-16819941E050}"/>
               </a:ext>
             </a:extLst>
           </p:cNvPr>
@@ -6457,7 +7070,7 @@
           <p:cNvPr id="25" name="Ellipse 24">
             <a:extLst>
               <a:ext uri="{FF2B5EF4-FFF2-40B4-BE49-F238E27FC236}">
-                <a16:creationId xmlns:a16="http://schemas.microsoft.com/office/drawing/2014/main" xmlns="" id="{8DE5C593-10CE-40D9-9D92-7F092045A794}"/>
+                <a16:creationId xmlns:a16="http://schemas.microsoft.com/office/drawing/2014/main" id="{8DE5C593-10CE-40D9-9D92-7F092045A794}"/>
               </a:ext>
             </a:extLst>
           </p:cNvPr>
@@ -6503,18 +7116,13 @@
           <a:p>
             <a:pPr algn="ctr"/>
             <a:r>
-              <a:rPr lang="fr-FR" dirty="0" smtClean="0">
+              <a:rPr lang="fr-FR" dirty="0">
                 <a:solidFill>
                   <a:schemeClr val="tx1"/>
                 </a:solidFill>
               </a:rPr>
               <a:t>Réserver un créneau horaire</a:t>
             </a:r>
-            <a:endParaRPr lang="fr-FR" dirty="0">
-              <a:solidFill>
-                <a:schemeClr val="tx1"/>
-              </a:solidFill>
-            </a:endParaRPr>
           </a:p>
         </p:txBody>
       </p:sp>
@@ -6523,7 +7131,7 @@
           <p:cNvPr id="32" name="Connecteur droit 31">
             <a:extLst>
               <a:ext uri="{FF2B5EF4-FFF2-40B4-BE49-F238E27FC236}">
-                <a16:creationId xmlns:a16="http://schemas.microsoft.com/office/drawing/2014/main" xmlns="" id="{182766B4-113A-4456-9F5C-D5373D99B750}"/>
+                <a16:creationId xmlns:a16="http://schemas.microsoft.com/office/drawing/2014/main" id="{182766B4-113A-4456-9F5C-D5373D99B750}"/>
               </a:ext>
             </a:extLst>
           </p:cNvPr>
@@ -6568,7 +7176,7 @@
           <p:cNvPr id="42" name="Connecteur droit avec flèche 41">
             <a:extLst>
               <a:ext uri="{FF2B5EF4-FFF2-40B4-BE49-F238E27FC236}">
-                <a16:creationId xmlns:a16="http://schemas.microsoft.com/office/drawing/2014/main" xmlns="" id="{D186EB09-B5F6-4EE7-A72D-0599C9D2A89D}"/>
+                <a16:creationId xmlns:a16="http://schemas.microsoft.com/office/drawing/2014/main" id="{D186EB09-B5F6-4EE7-A72D-0599C9D2A89D}"/>
               </a:ext>
             </a:extLst>
           </p:cNvPr>
@@ -6615,7 +7223,7 @@
           <p:cNvPr id="48" name="ZoneTexte 47">
             <a:extLst>
               <a:ext uri="{FF2B5EF4-FFF2-40B4-BE49-F238E27FC236}">
-                <a16:creationId xmlns:a16="http://schemas.microsoft.com/office/drawing/2014/main" xmlns="" id="{22E20B09-B403-4A80-BD1E-16819941E050}"/>
+                <a16:creationId xmlns:a16="http://schemas.microsoft.com/office/drawing/2014/main" id="{22E20B09-B403-4A80-BD1E-16819941E050}"/>
               </a:ext>
             </a:extLst>
           </p:cNvPr>
@@ -6651,7 +7259,7 @@
           <p:cNvPr id="51" name="Connecteur droit avec flèche 50">
             <a:extLst>
               <a:ext uri="{FF2B5EF4-FFF2-40B4-BE49-F238E27FC236}">
-                <a16:creationId xmlns:a16="http://schemas.microsoft.com/office/drawing/2014/main" xmlns="" id="{D186EB09-B5F6-4EE7-A72D-0599C9D2A89D}"/>
+                <a16:creationId xmlns:a16="http://schemas.microsoft.com/office/drawing/2014/main" id="{D186EB09-B5F6-4EE7-A72D-0599C9D2A89D}"/>
               </a:ext>
             </a:extLst>
           </p:cNvPr>
@@ -6693,10 +7301,116 @@
           </a:fontRef>
         </p:style>
       </p:cxnSp>
+      <p:sp>
+        <p:nvSpPr>
+          <p:cNvPr id="19" name="Rectangle : carré corné 18">
+            <a:extLst>
+              <a:ext uri="{FF2B5EF4-FFF2-40B4-BE49-F238E27FC236}">
+                <a16:creationId xmlns:a16="http://schemas.microsoft.com/office/drawing/2014/main" id="{5F07E469-C343-4E58-8551-0D97F8DE0072}"/>
+              </a:ext>
+            </a:extLst>
+          </p:cNvPr>
+          <p:cNvSpPr/>
+          <p:nvPr/>
+        </p:nvSpPr>
+        <p:spPr>
+          <a:xfrm>
+            <a:off x="5340185" y="4091379"/>
+            <a:ext cx="2029547" cy="898940"/>
+          </a:xfrm>
+          <a:prstGeom prst="foldedCorner">
+            <a:avLst/>
+          </a:prstGeom>
+          <a:solidFill>
+            <a:schemeClr val="bg1"/>
+          </a:solidFill>
+          <a:ln w="19050" cap="sq">
+            <a:solidFill>
+              <a:schemeClr val="tx1"/>
+            </a:solidFill>
+          </a:ln>
+        </p:spPr>
+        <p:style>
+          <a:lnRef idx="2">
+            <a:schemeClr val="accent1">
+              <a:shade val="50000"/>
+            </a:schemeClr>
+          </a:lnRef>
+          <a:fillRef idx="1">
+            <a:schemeClr val="accent1"/>
+          </a:fillRef>
+          <a:effectRef idx="0">
+            <a:schemeClr val="accent1"/>
+          </a:effectRef>
+          <a:fontRef idx="minor">
+            <a:schemeClr val="lt1"/>
+          </a:fontRef>
+        </p:style>
+        <p:txBody>
+          <a:bodyPr rtlCol="0" anchor="t"/>
+          <a:lstStyle/>
+          <a:p>
+            <a:pPr algn="ctr"/>
+            <a:r>
+              <a:rPr lang="fr-FR" dirty="0">
+                <a:solidFill>
+                  <a:schemeClr val="tx1"/>
+                </a:solidFill>
+              </a:rPr>
+              <a:t>Condition : Propriétaire de la réservation</a:t>
+            </a:r>
+          </a:p>
+        </p:txBody>
+      </p:sp>
+      <p:cxnSp>
+        <p:nvCxnSpPr>
+          <p:cNvPr id="20" name="Connecteur droit 19">
+            <a:extLst>
+              <a:ext uri="{FF2B5EF4-FFF2-40B4-BE49-F238E27FC236}">
+                <a16:creationId xmlns:a16="http://schemas.microsoft.com/office/drawing/2014/main" id="{4098C2F1-7152-4DF4-A779-CA8856966C2A}"/>
+              </a:ext>
+            </a:extLst>
+          </p:cNvPr>
+          <p:cNvCxnSpPr>
+            <a:cxnSpLocks/>
+            <a:stCxn id="19" idx="1"/>
+          </p:cNvCxnSpPr>
+          <p:nvPr/>
+        </p:nvCxnSpPr>
+        <p:spPr>
+          <a:xfrm flipH="1">
+            <a:off x="4115901" y="4540849"/>
+            <a:ext cx="1224284" cy="129341"/>
+          </a:xfrm>
+          <a:prstGeom prst="line">
+            <a:avLst/>
+          </a:prstGeom>
+          <a:ln w="25400">
+            <a:solidFill>
+              <a:schemeClr val="tx1"/>
+            </a:solidFill>
+            <a:prstDash val="lgDash"/>
+          </a:ln>
+        </p:spPr>
+        <p:style>
+          <a:lnRef idx="1">
+            <a:schemeClr val="accent1"/>
+          </a:lnRef>
+          <a:fillRef idx="0">
+            <a:schemeClr val="accent1"/>
+          </a:fillRef>
+          <a:effectRef idx="0">
+            <a:schemeClr val="accent1"/>
+          </a:effectRef>
+          <a:fontRef idx="minor">
+            <a:schemeClr val="tx1"/>
+          </a:fontRef>
+        </p:style>
+      </p:cxnSp>
     </p:spTree>
     <p:extLst>
       <p:ext uri="{BB962C8B-B14F-4D97-AF65-F5344CB8AC3E}">
-        <p14:creationId xmlns:p14="http://schemas.microsoft.com/office/powerpoint/2010/main" xmlns="" val="3611996577"/>
+        <p14:creationId xmlns:p14="http://schemas.microsoft.com/office/powerpoint/2010/main" val="3611996577"/>
       </p:ext>
     </p:extLst>
   </p:cSld>
@@ -6995,7 +7709,7 @@
   <a:extraClrSchemeLst/>
   <a:extLst>
     <a:ext uri="{05A4C25C-085E-4340-85A3-A5531E510DB2}">
-      <thm15:themeFamily xmlns:thm15="http://schemas.microsoft.com/office/thememl/2012/main" xmlns="" name="Office Theme" id="{62F939B6-93AF-4DB8-9C6B-D6C7DFDC589F}" vid="{4A3C46E8-61CC-4603-A589-7422A47A8E4A}"/>
+      <thm15:themeFamily xmlns:thm15="http://schemas.microsoft.com/office/thememl/2012/main" name="Office Theme" id="{62F939B6-93AF-4DB8-9C6B-D6C7DFDC589F}" vid="{4A3C46E8-61CC-4603-A589-7422A47A8E4A}"/>
     </a:ext>
   </a:extLst>
 </a:theme>

</xml_diff>